<commit_message>
Updated Diagram and added Data Sheet
</commit_message>
<xml_diff>
--- a/PandaSat Electronics.pptx
+++ b/PandaSat Electronics.pptx
@@ -259,7 +259,7 @@
           <a:p>
             <a:fld id="{2C593ACC-2424-2B4F-AF34-015A86F753B1}" type="datetimeFigureOut">
               <a:rPr lang="en-US" smtClean="0"/>
-              <a:t>1/15/19</a:t>
+              <a:t>1/28/2019</a:t>
             </a:fld>
             <a:endParaRPr lang="en-US"/>
           </a:p>
@@ -457,7 +457,7 @@
           <a:p>
             <a:fld id="{2C593ACC-2424-2B4F-AF34-015A86F753B1}" type="datetimeFigureOut">
               <a:rPr lang="en-US" smtClean="0"/>
-              <a:t>1/15/19</a:t>
+              <a:t>1/28/2019</a:t>
             </a:fld>
             <a:endParaRPr lang="en-US"/>
           </a:p>
@@ -665,7 +665,7 @@
           <a:p>
             <a:fld id="{2C593ACC-2424-2B4F-AF34-015A86F753B1}" type="datetimeFigureOut">
               <a:rPr lang="en-US" smtClean="0"/>
-              <a:t>1/15/19</a:t>
+              <a:t>1/28/2019</a:t>
             </a:fld>
             <a:endParaRPr lang="en-US"/>
           </a:p>
@@ -863,7 +863,7 @@
           <a:p>
             <a:fld id="{2C593ACC-2424-2B4F-AF34-015A86F753B1}" type="datetimeFigureOut">
               <a:rPr lang="en-US" smtClean="0"/>
-              <a:t>1/15/19</a:t>
+              <a:t>1/28/2019</a:t>
             </a:fld>
             <a:endParaRPr lang="en-US"/>
           </a:p>
@@ -1138,7 +1138,7 @@
           <a:p>
             <a:fld id="{2C593ACC-2424-2B4F-AF34-015A86F753B1}" type="datetimeFigureOut">
               <a:rPr lang="en-US" smtClean="0"/>
-              <a:t>1/15/19</a:t>
+              <a:t>1/28/2019</a:t>
             </a:fld>
             <a:endParaRPr lang="en-US"/>
           </a:p>
@@ -1403,7 +1403,7 @@
           <a:p>
             <a:fld id="{2C593ACC-2424-2B4F-AF34-015A86F753B1}" type="datetimeFigureOut">
               <a:rPr lang="en-US" smtClean="0"/>
-              <a:t>1/15/19</a:t>
+              <a:t>1/28/2019</a:t>
             </a:fld>
             <a:endParaRPr lang="en-US"/>
           </a:p>
@@ -1815,7 +1815,7 @@
           <a:p>
             <a:fld id="{2C593ACC-2424-2B4F-AF34-015A86F753B1}" type="datetimeFigureOut">
               <a:rPr lang="en-US" smtClean="0"/>
-              <a:t>1/15/19</a:t>
+              <a:t>1/28/2019</a:t>
             </a:fld>
             <a:endParaRPr lang="en-US"/>
           </a:p>
@@ -1956,7 +1956,7 @@
           <a:p>
             <a:fld id="{2C593ACC-2424-2B4F-AF34-015A86F753B1}" type="datetimeFigureOut">
               <a:rPr lang="en-US" smtClean="0"/>
-              <a:t>1/15/19</a:t>
+              <a:t>1/28/2019</a:t>
             </a:fld>
             <a:endParaRPr lang="en-US"/>
           </a:p>
@@ -2069,7 +2069,7 @@
           <a:p>
             <a:fld id="{2C593ACC-2424-2B4F-AF34-015A86F753B1}" type="datetimeFigureOut">
               <a:rPr lang="en-US" smtClean="0"/>
-              <a:t>1/15/19</a:t>
+              <a:t>1/28/2019</a:t>
             </a:fld>
             <a:endParaRPr lang="en-US"/>
           </a:p>
@@ -2380,7 +2380,7 @@
           <a:p>
             <a:fld id="{2C593ACC-2424-2B4F-AF34-015A86F753B1}" type="datetimeFigureOut">
               <a:rPr lang="en-US" smtClean="0"/>
-              <a:t>1/15/19</a:t>
+              <a:t>1/28/2019</a:t>
             </a:fld>
             <a:endParaRPr lang="en-US"/>
           </a:p>
@@ -2668,7 +2668,7 @@
           <a:p>
             <a:fld id="{2C593ACC-2424-2B4F-AF34-015A86F753B1}" type="datetimeFigureOut">
               <a:rPr lang="en-US" smtClean="0"/>
-              <a:t>1/15/19</a:t>
+              <a:t>1/28/2019</a:t>
             </a:fld>
             <a:endParaRPr lang="en-US"/>
           </a:p>
@@ -2909,7 +2909,7 @@
           <a:p>
             <a:fld id="{2C593ACC-2424-2B4F-AF34-015A86F753B1}" type="datetimeFigureOut">
               <a:rPr lang="en-US" smtClean="0"/>
-              <a:t>1/15/19</a:t>
+              <a:t>1/28/2019</a:t>
             </a:fld>
             <a:endParaRPr lang="en-US"/>
           </a:p>
@@ -3369,10 +3369,10 @@
       </p:sp>
       <p:sp>
         <p:nvSpPr>
-          <p:cNvPr id="5" name="TextBox 4">
-            <a:extLst>
-              <a:ext uri="{FF2B5EF4-FFF2-40B4-BE49-F238E27FC236}">
-                <a16:creationId xmlns:a16="http://schemas.microsoft.com/office/drawing/2014/main" id="{F11E1D26-8570-8F40-B59E-9018CE0E8061}"/>
+          <p:cNvPr id="6" name="TextBox 5">
+            <a:extLst>
+              <a:ext uri="{FF2B5EF4-FFF2-40B4-BE49-F238E27FC236}">
+                <a16:creationId xmlns:a16="http://schemas.microsoft.com/office/drawing/2014/main" id="{F4FF36EC-70D4-0A43-8A47-A432E0AE81E1}"/>
               </a:ext>
             </a:extLst>
           </p:cNvPr>
@@ -3381,7 +3381,7 @@
         </p:nvSpPr>
         <p:spPr>
           <a:xfrm>
-            <a:off x="798576" y="339832"/>
+            <a:off x="5145024" y="2988495"/>
             <a:ext cx="1109472" cy="369332"/>
           </a:xfrm>
           <a:prstGeom prst="rect">
@@ -3403,17 +3403,17 @@
             <a:pPr algn="ctr"/>
             <a:r>
               <a:rPr lang="en-US" dirty="0"/>
-              <a:t>Amp</a:t>
-            </a:r>
-          </a:p>
-        </p:txBody>
-      </p:sp>
-      <p:sp>
-        <p:nvSpPr>
-          <p:cNvPr id="6" name="TextBox 5">
-            <a:extLst>
-              <a:ext uri="{FF2B5EF4-FFF2-40B4-BE49-F238E27FC236}">
-                <a16:creationId xmlns:a16="http://schemas.microsoft.com/office/drawing/2014/main" id="{F4FF36EC-70D4-0A43-8A47-A432E0AE81E1}"/>
+              <a:t>SAMD51</a:t>
+            </a:r>
+          </a:p>
+        </p:txBody>
+      </p:sp>
+      <p:sp>
+        <p:nvSpPr>
+          <p:cNvPr id="8" name="TextBox 7">
+            <a:extLst>
+              <a:ext uri="{FF2B5EF4-FFF2-40B4-BE49-F238E27FC236}">
+                <a16:creationId xmlns:a16="http://schemas.microsoft.com/office/drawing/2014/main" id="{7E143DE2-6B78-D549-AA12-7D46353F2AFE}"/>
               </a:ext>
             </a:extLst>
           </p:cNvPr>
@@ -3422,7 +3422,7 @@
         </p:nvSpPr>
         <p:spPr>
           <a:xfrm>
-            <a:off x="5145024" y="2988495"/>
+            <a:off x="5145024" y="1433069"/>
             <a:ext cx="1109472" cy="369332"/>
           </a:xfrm>
           <a:prstGeom prst="rect">
@@ -3444,17 +3444,17 @@
             <a:pPr algn="ctr"/>
             <a:r>
               <a:rPr lang="en-US" dirty="0"/>
-              <a:t>ARM</a:t>
-            </a:r>
-          </a:p>
-        </p:txBody>
-      </p:sp>
-      <p:sp>
-        <p:nvSpPr>
-          <p:cNvPr id="7" name="TextBox 6">
-            <a:extLst>
-              <a:ext uri="{FF2B5EF4-FFF2-40B4-BE49-F238E27FC236}">
-                <a16:creationId xmlns:a16="http://schemas.microsoft.com/office/drawing/2014/main" id="{9D8C2247-7045-2242-8F10-940A28460524}"/>
+              <a:t>PMU</a:t>
+            </a:r>
+          </a:p>
+        </p:txBody>
+      </p:sp>
+      <p:sp>
+        <p:nvSpPr>
+          <p:cNvPr id="9" name="TextBox 8">
+            <a:extLst>
+              <a:ext uri="{FF2B5EF4-FFF2-40B4-BE49-F238E27FC236}">
+                <a16:creationId xmlns:a16="http://schemas.microsoft.com/office/drawing/2014/main" id="{42AD37F4-FBD6-2340-BEBA-A21F50F856E2}"/>
               </a:ext>
             </a:extLst>
           </p:cNvPr>
@@ -3463,8 +3463,8 @@
         </p:nvSpPr>
         <p:spPr>
           <a:xfrm>
-            <a:off x="3480816" y="2157983"/>
-            <a:ext cx="1109472" cy="646331"/>
+            <a:off x="8682287" y="1430827"/>
+            <a:ext cx="1736854" cy="369332"/>
           </a:xfrm>
           <a:prstGeom prst="rect">
             <a:avLst/>
@@ -3485,24 +3485,17 @@
             <a:pPr algn="ctr"/>
             <a:r>
               <a:rPr lang="en-US" dirty="0"/>
-              <a:t>Burn</a:t>
-            </a:r>
-          </a:p>
-          <a:p>
-            <a:pPr algn="ctr"/>
-            <a:r>
-              <a:rPr lang="en-US" dirty="0"/>
-              <a:t>Wires</a:t>
-            </a:r>
-          </a:p>
-        </p:txBody>
-      </p:sp>
-      <p:sp>
-        <p:nvSpPr>
-          <p:cNvPr id="8" name="TextBox 7">
-            <a:extLst>
-              <a:ext uri="{FF2B5EF4-FFF2-40B4-BE49-F238E27FC236}">
-                <a16:creationId xmlns:a16="http://schemas.microsoft.com/office/drawing/2014/main" id="{7E143DE2-6B78-D549-AA12-7D46353F2AFE}"/>
+              <a:t>Solar panels</a:t>
+            </a:r>
+          </a:p>
+        </p:txBody>
+      </p:sp>
+      <p:sp>
+        <p:nvSpPr>
+          <p:cNvPr id="11" name="TextBox 10">
+            <a:extLst>
+              <a:ext uri="{FF2B5EF4-FFF2-40B4-BE49-F238E27FC236}">
+                <a16:creationId xmlns:a16="http://schemas.microsoft.com/office/drawing/2014/main" id="{0AAEB7A8-E46A-E941-B782-E040632EF69C}"/>
               </a:ext>
             </a:extLst>
           </p:cNvPr>
@@ -3511,8 +3504,8 @@
         </p:nvSpPr>
         <p:spPr>
           <a:xfrm>
-            <a:off x="5145024" y="1433069"/>
-            <a:ext cx="1109472" cy="369332"/>
+            <a:off x="5074920" y="4422995"/>
+            <a:ext cx="1249680" cy="646331"/>
           </a:xfrm>
           <a:prstGeom prst="rect">
             <a:avLst/>
@@ -3533,17 +3526,24 @@
             <a:pPr algn="ctr"/>
             <a:r>
               <a:rPr lang="en-US" dirty="0"/>
-              <a:t>PMU</a:t>
-            </a:r>
-          </a:p>
-        </p:txBody>
-      </p:sp>
-      <p:sp>
-        <p:nvSpPr>
-          <p:cNvPr id="9" name="TextBox 8">
-            <a:extLst>
-              <a:ext uri="{FF2B5EF4-FFF2-40B4-BE49-F238E27FC236}">
-                <a16:creationId xmlns:a16="http://schemas.microsoft.com/office/drawing/2014/main" id="{42AD37F4-FBD6-2340-BEBA-A21F50F856E2}"/>
+              <a:t>Raspberry</a:t>
+            </a:r>
+          </a:p>
+          <a:p>
+            <a:pPr algn="ctr"/>
+            <a:r>
+              <a:rPr lang="en-US" dirty="0"/>
+              <a:t>PI</a:t>
+            </a:r>
+          </a:p>
+        </p:txBody>
+      </p:sp>
+      <p:sp>
+        <p:nvSpPr>
+          <p:cNvPr id="12" name="TextBox 11">
+            <a:extLst>
+              <a:ext uri="{FF2B5EF4-FFF2-40B4-BE49-F238E27FC236}">
+                <a16:creationId xmlns:a16="http://schemas.microsoft.com/office/drawing/2014/main" id="{7AD8A02B-4CEF-4349-AA2D-660F13A2A0A3}"/>
               </a:ext>
             </a:extLst>
           </p:cNvPr>
@@ -3552,7 +3552,7 @@
         </p:nvSpPr>
         <p:spPr>
           <a:xfrm>
-            <a:off x="5145024" y="444905"/>
+            <a:off x="3124200" y="4561495"/>
             <a:ext cx="1109472" cy="369332"/>
           </a:xfrm>
           <a:prstGeom prst="rect">
@@ -3574,17 +3574,17 @@
             <a:pPr algn="ctr"/>
             <a:r>
               <a:rPr lang="en-US" dirty="0"/>
-              <a:t>Solar</a:t>
-            </a:r>
-          </a:p>
-        </p:txBody>
-      </p:sp>
-      <p:sp>
-        <p:nvSpPr>
-          <p:cNvPr id="10" name="TextBox 9">
-            <a:extLst>
-              <a:ext uri="{FF2B5EF4-FFF2-40B4-BE49-F238E27FC236}">
-                <a16:creationId xmlns:a16="http://schemas.microsoft.com/office/drawing/2014/main" id="{5D8A466E-0DB5-E644-895F-614F5F1F81F9}"/>
+              <a:t>SDR</a:t>
+            </a:r>
+          </a:p>
+        </p:txBody>
+      </p:sp>
+      <p:sp>
+        <p:nvSpPr>
+          <p:cNvPr id="13" name="TextBox 12">
+            <a:extLst>
+              <a:ext uri="{FF2B5EF4-FFF2-40B4-BE49-F238E27FC236}">
+                <a16:creationId xmlns:a16="http://schemas.microsoft.com/office/drawing/2014/main" id="{033FEC26-BAC6-C243-864C-52E3F6457725}"/>
               </a:ext>
             </a:extLst>
           </p:cNvPr>
@@ -3593,8 +3593,8 @@
         </p:nvSpPr>
         <p:spPr>
           <a:xfrm>
-            <a:off x="7461504" y="1433069"/>
-            <a:ext cx="1109472" cy="369332"/>
+            <a:off x="3004313" y="2088967"/>
+            <a:ext cx="1572766" cy="369332"/>
           </a:xfrm>
           <a:prstGeom prst="rect">
             <a:avLst/>
@@ -3614,18 +3614,22 @@
           <a:p>
             <a:pPr algn="ctr"/>
             <a:r>
+              <a:rPr lang="en-US" dirty="0" err="1"/>
+              <a:t>Gryo</a:t>
+            </a:r>
+            <a:r>
               <a:rPr lang="en-US" dirty="0"/>
-              <a:t>Batteries</a:t>
-            </a:r>
-          </a:p>
-        </p:txBody>
-      </p:sp>
-      <p:sp>
-        <p:nvSpPr>
-          <p:cNvPr id="11" name="TextBox 10">
-            <a:extLst>
-              <a:ext uri="{FF2B5EF4-FFF2-40B4-BE49-F238E27FC236}">
-                <a16:creationId xmlns:a16="http://schemas.microsoft.com/office/drawing/2014/main" id="{0AAEB7A8-E46A-E941-B782-E040632EF69C}"/>
+              <a:t>/Mag</a:t>
+            </a:r>
+          </a:p>
+        </p:txBody>
+      </p:sp>
+      <p:sp>
+        <p:nvSpPr>
+          <p:cNvPr id="15" name="TextBox 14">
+            <a:extLst>
+              <a:ext uri="{FF2B5EF4-FFF2-40B4-BE49-F238E27FC236}">
+                <a16:creationId xmlns:a16="http://schemas.microsoft.com/office/drawing/2014/main" id="{95AC9320-D6F3-4241-9010-D727BB13F47E}"/>
               </a:ext>
             </a:extLst>
           </p:cNvPr>
@@ -3634,8 +3638,8 @@
         </p:nvSpPr>
         <p:spPr>
           <a:xfrm>
-            <a:off x="5074920" y="4422995"/>
-            <a:ext cx="1249680" cy="646331"/>
+            <a:off x="6592216" y="2988737"/>
+            <a:ext cx="1360585" cy="369332"/>
           </a:xfrm>
           <a:prstGeom prst="rect">
             <a:avLst/>
@@ -3656,24 +3660,294 @@
             <a:pPr algn="ctr"/>
             <a:r>
               <a:rPr lang="en-US" dirty="0"/>
-              <a:t>Raspberry</a:t>
-            </a:r>
-          </a:p>
-          <a:p>
-            <a:pPr algn="ctr"/>
-            <a:r>
-              <a:rPr lang="en-US" dirty="0"/>
-              <a:t>PI</a:t>
-            </a:r>
-          </a:p>
-        </p:txBody>
-      </p:sp>
-      <p:sp>
-        <p:nvSpPr>
-          <p:cNvPr id="12" name="TextBox 11">
-            <a:extLst>
-              <a:ext uri="{FF2B5EF4-FFF2-40B4-BE49-F238E27FC236}">
-                <a16:creationId xmlns:a16="http://schemas.microsoft.com/office/drawing/2014/main" id="{7AD8A02B-4CEF-4349-AA2D-660F13A2A0A3}"/>
+              <a:t>H-Bridges</a:t>
+            </a:r>
+          </a:p>
+        </p:txBody>
+      </p:sp>
+      <p:cxnSp>
+        <p:nvCxnSpPr>
+          <p:cNvPr id="17" name="Straight Connector 16">
+            <a:extLst>
+              <a:ext uri="{FF2B5EF4-FFF2-40B4-BE49-F238E27FC236}">
+                <a16:creationId xmlns:a16="http://schemas.microsoft.com/office/drawing/2014/main" id="{0E8BA344-F30E-024E-A720-186375E1E47C}"/>
+              </a:ext>
+            </a:extLst>
+          </p:cNvPr>
+          <p:cNvCxnSpPr>
+            <a:cxnSpLocks/>
+            <a:endCxn id="4" idx="0"/>
+          </p:cNvCxnSpPr>
+          <p:nvPr/>
+        </p:nvCxnSpPr>
+        <p:spPr>
+          <a:xfrm>
+            <a:off x="1353312" y="709164"/>
+            <a:ext cx="0" cy="551164"/>
+          </a:xfrm>
+          <a:prstGeom prst="line">
+            <a:avLst/>
+          </a:prstGeom>
+        </p:spPr>
+        <p:style>
+          <a:lnRef idx="1">
+            <a:schemeClr val="accent1"/>
+          </a:lnRef>
+          <a:fillRef idx="0">
+            <a:schemeClr val="accent1"/>
+          </a:fillRef>
+          <a:effectRef idx="0">
+            <a:schemeClr val="accent1"/>
+          </a:effectRef>
+          <a:fontRef idx="minor">
+            <a:schemeClr val="tx1"/>
+          </a:fontRef>
+        </p:style>
+      </p:cxnSp>
+      <p:cxnSp>
+        <p:nvCxnSpPr>
+          <p:cNvPr id="20" name="Straight Connector 19">
+            <a:extLst>
+              <a:ext uri="{FF2B5EF4-FFF2-40B4-BE49-F238E27FC236}">
+                <a16:creationId xmlns:a16="http://schemas.microsoft.com/office/drawing/2014/main" id="{AA29920D-C1CB-2440-B7E8-1E8572CB3B87}"/>
+              </a:ext>
+            </a:extLst>
+          </p:cNvPr>
+          <p:cNvCxnSpPr>
+            <a:cxnSpLocks/>
+            <a:stCxn id="4" idx="2"/>
+          </p:cNvCxnSpPr>
+          <p:nvPr/>
+        </p:nvCxnSpPr>
+        <p:spPr>
+          <a:xfrm>
+            <a:off x="1353312" y="1906659"/>
+            <a:ext cx="0" cy="1266502"/>
+          </a:xfrm>
+          <a:prstGeom prst="line">
+            <a:avLst/>
+          </a:prstGeom>
+        </p:spPr>
+        <p:style>
+          <a:lnRef idx="1">
+            <a:schemeClr val="accent1"/>
+          </a:lnRef>
+          <a:fillRef idx="0">
+            <a:schemeClr val="accent1"/>
+          </a:fillRef>
+          <a:effectRef idx="0">
+            <a:schemeClr val="accent1"/>
+          </a:effectRef>
+          <a:fontRef idx="minor">
+            <a:schemeClr val="tx1"/>
+          </a:fontRef>
+        </p:style>
+      </p:cxnSp>
+      <p:cxnSp>
+        <p:nvCxnSpPr>
+          <p:cNvPr id="23" name="Straight Connector 22">
+            <a:extLst>
+              <a:ext uri="{FF2B5EF4-FFF2-40B4-BE49-F238E27FC236}">
+                <a16:creationId xmlns:a16="http://schemas.microsoft.com/office/drawing/2014/main" id="{41D76BA0-132E-484B-8E02-E7F815A5FDA3}"/>
+              </a:ext>
+            </a:extLst>
+          </p:cNvPr>
+          <p:cNvCxnSpPr>
+            <a:cxnSpLocks/>
+            <a:endCxn id="6" idx="1"/>
+          </p:cNvCxnSpPr>
+          <p:nvPr/>
+        </p:nvCxnSpPr>
+        <p:spPr>
+          <a:xfrm>
+            <a:off x="1353312" y="3156493"/>
+            <a:ext cx="3791712" cy="16668"/>
+          </a:xfrm>
+          <a:prstGeom prst="line">
+            <a:avLst/>
+          </a:prstGeom>
+        </p:spPr>
+        <p:style>
+          <a:lnRef idx="1">
+            <a:schemeClr val="accent1"/>
+          </a:lnRef>
+          <a:fillRef idx="0">
+            <a:schemeClr val="accent1"/>
+          </a:fillRef>
+          <a:effectRef idx="0">
+            <a:schemeClr val="accent1"/>
+          </a:effectRef>
+          <a:fontRef idx="minor">
+            <a:schemeClr val="tx1"/>
+          </a:fontRef>
+        </p:style>
+      </p:cxnSp>
+      <p:cxnSp>
+        <p:nvCxnSpPr>
+          <p:cNvPr id="40" name="Straight Connector 39">
+            <a:extLst>
+              <a:ext uri="{FF2B5EF4-FFF2-40B4-BE49-F238E27FC236}">
+                <a16:creationId xmlns:a16="http://schemas.microsoft.com/office/drawing/2014/main" id="{33F1D104-0B59-4147-8205-1724CCD3457F}"/>
+              </a:ext>
+            </a:extLst>
+          </p:cNvPr>
+          <p:cNvCxnSpPr>
+            <a:cxnSpLocks/>
+            <a:stCxn id="72" idx="3"/>
+            <a:endCxn id="8" idx="1"/>
+          </p:cNvCxnSpPr>
+          <p:nvPr/>
+        </p:nvCxnSpPr>
+        <p:spPr>
+          <a:xfrm>
+            <a:off x="4425912" y="1617735"/>
+            <a:ext cx="719112" cy="0"/>
+          </a:xfrm>
+          <a:prstGeom prst="line">
+            <a:avLst/>
+          </a:prstGeom>
+        </p:spPr>
+        <p:style>
+          <a:lnRef idx="1">
+            <a:schemeClr val="accent1"/>
+          </a:lnRef>
+          <a:fillRef idx="0">
+            <a:schemeClr val="accent1"/>
+          </a:fillRef>
+          <a:effectRef idx="0">
+            <a:schemeClr val="accent1"/>
+          </a:effectRef>
+          <a:fontRef idx="minor">
+            <a:schemeClr val="tx1"/>
+          </a:fontRef>
+        </p:style>
+      </p:cxnSp>
+      <p:cxnSp>
+        <p:nvCxnSpPr>
+          <p:cNvPr id="54" name="Straight Connector 53">
+            <a:extLst>
+              <a:ext uri="{FF2B5EF4-FFF2-40B4-BE49-F238E27FC236}">
+                <a16:creationId xmlns:a16="http://schemas.microsoft.com/office/drawing/2014/main" id="{0AB640FA-7521-F148-9E2C-F16253D0FD5F}"/>
+              </a:ext>
+            </a:extLst>
+          </p:cNvPr>
+          <p:cNvCxnSpPr>
+            <a:cxnSpLocks/>
+            <a:stCxn id="8" idx="2"/>
+            <a:endCxn id="6" idx="0"/>
+          </p:cNvCxnSpPr>
+          <p:nvPr/>
+        </p:nvCxnSpPr>
+        <p:spPr>
+          <a:xfrm>
+            <a:off x="5699760" y="1802401"/>
+            <a:ext cx="0" cy="1186094"/>
+          </a:xfrm>
+          <a:prstGeom prst="line">
+            <a:avLst/>
+          </a:prstGeom>
+        </p:spPr>
+        <p:style>
+          <a:lnRef idx="1">
+            <a:schemeClr val="accent1"/>
+          </a:lnRef>
+          <a:fillRef idx="0">
+            <a:schemeClr val="accent1"/>
+          </a:fillRef>
+          <a:effectRef idx="0">
+            <a:schemeClr val="accent1"/>
+          </a:effectRef>
+          <a:fontRef idx="minor">
+            <a:schemeClr val="tx1"/>
+          </a:fontRef>
+        </p:style>
+      </p:cxnSp>
+      <p:cxnSp>
+        <p:nvCxnSpPr>
+          <p:cNvPr id="65" name="Straight Connector 64">
+            <a:extLst>
+              <a:ext uri="{FF2B5EF4-FFF2-40B4-BE49-F238E27FC236}">
+                <a16:creationId xmlns:a16="http://schemas.microsoft.com/office/drawing/2014/main" id="{8D838D16-38EC-2141-8F41-F55A7264DEB5}"/>
+              </a:ext>
+            </a:extLst>
+          </p:cNvPr>
+          <p:cNvCxnSpPr>
+            <a:cxnSpLocks/>
+            <a:stCxn id="6" idx="2"/>
+            <a:endCxn id="11" idx="0"/>
+          </p:cNvCxnSpPr>
+          <p:nvPr/>
+        </p:nvCxnSpPr>
+        <p:spPr>
+          <a:xfrm>
+            <a:off x="5699760" y="3357827"/>
+            <a:ext cx="0" cy="1065168"/>
+          </a:xfrm>
+          <a:prstGeom prst="line">
+            <a:avLst/>
+          </a:prstGeom>
+        </p:spPr>
+        <p:style>
+          <a:lnRef idx="1">
+            <a:schemeClr val="accent1"/>
+          </a:lnRef>
+          <a:fillRef idx="0">
+            <a:schemeClr val="accent1"/>
+          </a:fillRef>
+          <a:effectRef idx="0">
+            <a:schemeClr val="accent1"/>
+          </a:effectRef>
+          <a:fontRef idx="minor">
+            <a:schemeClr val="tx1"/>
+          </a:fontRef>
+        </p:style>
+      </p:cxnSp>
+      <p:cxnSp>
+        <p:nvCxnSpPr>
+          <p:cNvPr id="69" name="Straight Connector 68">
+            <a:extLst>
+              <a:ext uri="{FF2B5EF4-FFF2-40B4-BE49-F238E27FC236}">
+                <a16:creationId xmlns:a16="http://schemas.microsoft.com/office/drawing/2014/main" id="{276E0EFF-76B9-BD4C-B9F5-390D8F58DCCF}"/>
+              </a:ext>
+            </a:extLst>
+          </p:cNvPr>
+          <p:cNvCxnSpPr>
+            <a:cxnSpLocks/>
+            <a:stCxn id="12" idx="3"/>
+            <a:endCxn id="11" idx="1"/>
+          </p:cNvCxnSpPr>
+          <p:nvPr/>
+        </p:nvCxnSpPr>
+        <p:spPr>
+          <a:xfrm>
+            <a:off x="4233672" y="4746161"/>
+            <a:ext cx="841248" cy="0"/>
+          </a:xfrm>
+          <a:prstGeom prst="line">
+            <a:avLst/>
+          </a:prstGeom>
+        </p:spPr>
+        <p:style>
+          <a:lnRef idx="1">
+            <a:schemeClr val="accent1"/>
+          </a:lnRef>
+          <a:fillRef idx="0">
+            <a:schemeClr val="accent1"/>
+          </a:fillRef>
+          <a:effectRef idx="0">
+            <a:schemeClr val="accent1"/>
+          </a:effectRef>
+          <a:fontRef idx="minor">
+            <a:schemeClr val="tx1"/>
+          </a:fontRef>
+        </p:style>
+      </p:cxnSp>
+      <p:sp>
+        <p:nvSpPr>
+          <p:cNvPr id="93" name="TextBox 92">
+            <a:extLst>
+              <a:ext uri="{FF2B5EF4-FFF2-40B4-BE49-F238E27FC236}">
+                <a16:creationId xmlns:a16="http://schemas.microsoft.com/office/drawing/2014/main" id="{96B5813C-ED76-2344-AAEB-A8B4FCC94C62}"/>
               </a:ext>
             </a:extLst>
           </p:cNvPr>
@@ -3682,8 +3956,78 @@
         </p:nvSpPr>
         <p:spPr>
           <a:xfrm>
-            <a:off x="3124200" y="4561495"/>
-            <a:ext cx="1109472" cy="369332"/>
+            <a:off x="4560607" y="1367152"/>
+            <a:ext cx="502061" cy="276999"/>
+          </a:xfrm>
+          <a:prstGeom prst="rect">
+            <a:avLst/>
+          </a:prstGeom>
+          <a:noFill/>
+        </p:spPr>
+        <p:txBody>
+          <a:bodyPr wrap="none" rtlCol="0">
+            <a:spAutoFit/>
+          </a:bodyPr>
+          <a:lstStyle/>
+          <a:p>
+            <a:r>
+              <a:rPr lang="en-US" sz="1200" dirty="0"/>
+              <a:t>8.4 V</a:t>
+            </a:r>
+          </a:p>
+        </p:txBody>
+      </p:sp>
+      <p:sp>
+        <p:nvSpPr>
+          <p:cNvPr id="94" name="TextBox 93">
+            <a:extLst>
+              <a:ext uri="{FF2B5EF4-FFF2-40B4-BE49-F238E27FC236}">
+                <a16:creationId xmlns:a16="http://schemas.microsoft.com/office/drawing/2014/main" id="{221A182C-1F6D-DC46-8E9F-56227BF97B5D}"/>
+              </a:ext>
+            </a:extLst>
+          </p:cNvPr>
+          <p:cNvSpPr txBox="1"/>
+          <p:nvPr/>
+        </p:nvSpPr>
+        <p:spPr>
+          <a:xfrm>
+            <a:off x="6844988" y="1367151"/>
+            <a:ext cx="855042" cy="276999"/>
+          </a:xfrm>
+          <a:prstGeom prst="rect">
+            <a:avLst/>
+          </a:prstGeom>
+          <a:noFill/>
+        </p:spPr>
+        <p:txBody>
+          <a:bodyPr wrap="none" rtlCol="0">
+            <a:spAutoFit/>
+          </a:bodyPr>
+          <a:lstStyle/>
+          <a:p>
+            <a:r>
+              <a:rPr lang="en-US" sz="1200" dirty="0"/>
+              <a:t>&gt; 8.4V, 6W</a:t>
+            </a:r>
+          </a:p>
+        </p:txBody>
+      </p:sp>
+      <p:sp>
+        <p:nvSpPr>
+          <p:cNvPr id="39" name="TextBox 38">
+            <a:extLst>
+              <a:ext uri="{FF2B5EF4-FFF2-40B4-BE49-F238E27FC236}">
+                <a16:creationId xmlns:a16="http://schemas.microsoft.com/office/drawing/2014/main" id="{3F97B85D-86A0-C944-856C-35F3DCEF7360}"/>
+              </a:ext>
+            </a:extLst>
+          </p:cNvPr>
+          <p:cNvSpPr txBox="1"/>
+          <p:nvPr/>
+        </p:nvSpPr>
+        <p:spPr>
+          <a:xfrm>
+            <a:off x="6766560" y="4561495"/>
+            <a:ext cx="1249680" cy="369332"/>
           </a:xfrm>
           <a:prstGeom prst="rect">
             <a:avLst/>
@@ -3704,17 +4048,57 @@
             <a:pPr algn="ctr"/>
             <a:r>
               <a:rPr lang="en-US" dirty="0"/>
-              <a:t>SDR</a:t>
-            </a:r>
-          </a:p>
-        </p:txBody>
-      </p:sp>
-      <p:sp>
-        <p:nvSpPr>
-          <p:cNvPr id="13" name="TextBox 12">
-            <a:extLst>
-              <a:ext uri="{FF2B5EF4-FFF2-40B4-BE49-F238E27FC236}">
-                <a16:creationId xmlns:a16="http://schemas.microsoft.com/office/drawing/2014/main" id="{033FEC26-BAC6-C243-864C-52E3F6457725}"/>
+              <a:t>GPS</a:t>
+            </a:r>
+          </a:p>
+        </p:txBody>
+      </p:sp>
+      <p:cxnSp>
+        <p:nvCxnSpPr>
+          <p:cNvPr id="3" name="Straight Connector 2">
+            <a:extLst>
+              <a:ext uri="{FF2B5EF4-FFF2-40B4-BE49-F238E27FC236}">
+                <a16:creationId xmlns:a16="http://schemas.microsoft.com/office/drawing/2014/main" id="{73AA2462-7369-C741-A817-60A7F51FF3E8}"/>
+              </a:ext>
+            </a:extLst>
+          </p:cNvPr>
+          <p:cNvCxnSpPr>
+            <a:cxnSpLocks/>
+            <a:stCxn id="39" idx="1"/>
+            <a:endCxn id="11" idx="3"/>
+          </p:cNvCxnSpPr>
+          <p:nvPr/>
+        </p:nvCxnSpPr>
+        <p:spPr>
+          <a:xfrm flipH="1">
+            <a:off x="6324600" y="4746161"/>
+            <a:ext cx="441960" cy="0"/>
+          </a:xfrm>
+          <a:prstGeom prst="line">
+            <a:avLst/>
+          </a:prstGeom>
+        </p:spPr>
+        <p:style>
+          <a:lnRef idx="1">
+            <a:schemeClr val="accent1"/>
+          </a:lnRef>
+          <a:fillRef idx="0">
+            <a:schemeClr val="accent1"/>
+          </a:fillRef>
+          <a:effectRef idx="0">
+            <a:schemeClr val="accent1"/>
+          </a:effectRef>
+          <a:fontRef idx="minor">
+            <a:schemeClr val="tx1"/>
+          </a:fontRef>
+        </p:style>
+      </p:cxnSp>
+      <p:sp>
+        <p:nvSpPr>
+          <p:cNvPr id="43" name="TextBox 42">
+            <a:extLst>
+              <a:ext uri="{FF2B5EF4-FFF2-40B4-BE49-F238E27FC236}">
+                <a16:creationId xmlns:a16="http://schemas.microsoft.com/office/drawing/2014/main" id="{3EBA54D1-85C7-0248-A2C7-0884692EC57A}"/>
               </a:ext>
             </a:extLst>
           </p:cNvPr>
@@ -3723,8 +4107,352 @@
         </p:nvSpPr>
         <p:spPr>
           <a:xfrm>
-            <a:off x="6324600" y="2475887"/>
-            <a:ext cx="1408176" cy="369332"/>
+            <a:off x="4717608" y="3684816"/>
+            <a:ext cx="1046825" cy="276999"/>
+          </a:xfrm>
+          <a:prstGeom prst="rect">
+            <a:avLst/>
+          </a:prstGeom>
+          <a:noFill/>
+        </p:spPr>
+        <p:txBody>
+          <a:bodyPr wrap="none" rtlCol="0">
+            <a:spAutoFit/>
+          </a:bodyPr>
+          <a:lstStyle/>
+          <a:p>
+            <a:r>
+              <a:rPr lang="en-US" sz="1200" dirty="0"/>
+              <a:t>Data &amp; Power</a:t>
+            </a:r>
+          </a:p>
+        </p:txBody>
+      </p:sp>
+      <p:sp>
+        <p:nvSpPr>
+          <p:cNvPr id="45" name="TextBox 44">
+            <a:extLst>
+              <a:ext uri="{FF2B5EF4-FFF2-40B4-BE49-F238E27FC236}">
+                <a16:creationId xmlns:a16="http://schemas.microsoft.com/office/drawing/2014/main" id="{23D2131A-4B85-D246-8A78-5E5444810833}"/>
+              </a:ext>
+            </a:extLst>
+          </p:cNvPr>
+          <p:cNvSpPr txBox="1"/>
+          <p:nvPr/>
+        </p:nvSpPr>
+        <p:spPr>
+          <a:xfrm>
+            <a:off x="2032861" y="2889612"/>
+            <a:ext cx="474745" cy="276999"/>
+          </a:xfrm>
+          <a:prstGeom prst="rect">
+            <a:avLst/>
+          </a:prstGeom>
+          <a:noFill/>
+        </p:spPr>
+        <p:txBody>
+          <a:bodyPr wrap="none" rtlCol="0">
+            <a:spAutoFit/>
+          </a:bodyPr>
+          <a:lstStyle/>
+          <a:p>
+            <a:r>
+              <a:rPr lang="en-US" sz="1200" dirty="0"/>
+              <a:t>Data</a:t>
+            </a:r>
+          </a:p>
+        </p:txBody>
+      </p:sp>
+      <p:sp>
+        <p:nvSpPr>
+          <p:cNvPr id="18" name="Triangle 17">
+            <a:extLst>
+              <a:ext uri="{FF2B5EF4-FFF2-40B4-BE49-F238E27FC236}">
+                <a16:creationId xmlns:a16="http://schemas.microsoft.com/office/drawing/2014/main" id="{C42B2746-EA50-B649-A2A1-BCEFE3846223}"/>
+              </a:ext>
+            </a:extLst>
+          </p:cNvPr>
+          <p:cNvSpPr/>
+          <p:nvPr/>
+        </p:nvSpPr>
+        <p:spPr>
+          <a:xfrm rot="5400000">
+            <a:off x="1908048" y="4561495"/>
+            <a:ext cx="505968" cy="369332"/>
+          </a:xfrm>
+          <a:prstGeom prst="triangle">
+            <a:avLst/>
+          </a:prstGeom>
+        </p:spPr>
+        <p:style>
+          <a:lnRef idx="2">
+            <a:schemeClr val="accent1">
+              <a:shade val="50000"/>
+            </a:schemeClr>
+          </a:lnRef>
+          <a:fillRef idx="1">
+            <a:schemeClr val="accent1"/>
+          </a:fillRef>
+          <a:effectRef idx="0">
+            <a:schemeClr val="accent1"/>
+          </a:effectRef>
+          <a:fontRef idx="minor">
+            <a:schemeClr val="lt1"/>
+          </a:fontRef>
+        </p:style>
+        <p:txBody>
+          <a:bodyPr rtlCol="0" anchor="ctr"/>
+          <a:lstStyle/>
+          <a:p>
+            <a:pPr algn="ctr"/>
+            <a:endParaRPr lang="en-US"/>
+          </a:p>
+        </p:txBody>
+      </p:sp>
+      <p:sp>
+        <p:nvSpPr>
+          <p:cNvPr id="48" name="Triangle 47">
+            <a:extLst>
+              <a:ext uri="{FF2B5EF4-FFF2-40B4-BE49-F238E27FC236}">
+                <a16:creationId xmlns:a16="http://schemas.microsoft.com/office/drawing/2014/main" id="{E7CD0DA0-8559-7D48-8D8C-6CDB54884023}"/>
+              </a:ext>
+            </a:extLst>
+          </p:cNvPr>
+          <p:cNvSpPr/>
+          <p:nvPr/>
+        </p:nvSpPr>
+        <p:spPr>
+          <a:xfrm rot="10800000">
+            <a:off x="1100328" y="383165"/>
+            <a:ext cx="505968" cy="369332"/>
+          </a:xfrm>
+          <a:prstGeom prst="triangle">
+            <a:avLst/>
+          </a:prstGeom>
+        </p:spPr>
+        <p:style>
+          <a:lnRef idx="2">
+            <a:schemeClr val="accent1">
+              <a:shade val="50000"/>
+            </a:schemeClr>
+          </a:lnRef>
+          <a:fillRef idx="1">
+            <a:schemeClr val="accent1"/>
+          </a:fillRef>
+          <a:effectRef idx="0">
+            <a:schemeClr val="accent1"/>
+          </a:effectRef>
+          <a:fontRef idx="minor">
+            <a:schemeClr val="lt1"/>
+          </a:fontRef>
+        </p:style>
+        <p:txBody>
+          <a:bodyPr rtlCol="0" anchor="ctr"/>
+          <a:lstStyle/>
+          <a:p>
+            <a:pPr algn="r"/>
+            <a:endParaRPr lang="en-US" dirty="0"/>
+          </a:p>
+        </p:txBody>
+      </p:sp>
+      <p:cxnSp>
+        <p:nvCxnSpPr>
+          <p:cNvPr id="25" name="Straight Connector 24">
+            <a:extLst>
+              <a:ext uri="{FF2B5EF4-FFF2-40B4-BE49-F238E27FC236}">
+                <a16:creationId xmlns:a16="http://schemas.microsoft.com/office/drawing/2014/main" id="{E99DD24D-D66E-B54C-831B-8A36B63DFB6D}"/>
+              </a:ext>
+            </a:extLst>
+          </p:cNvPr>
+          <p:cNvCxnSpPr>
+            <a:cxnSpLocks/>
+            <a:stCxn id="12" idx="1"/>
+            <a:endCxn id="18" idx="0"/>
+          </p:cNvCxnSpPr>
+          <p:nvPr/>
+        </p:nvCxnSpPr>
+        <p:spPr>
+          <a:xfrm flipH="1">
+            <a:off x="2345698" y="4746161"/>
+            <a:ext cx="778502" cy="0"/>
+          </a:xfrm>
+          <a:prstGeom prst="line">
+            <a:avLst/>
+          </a:prstGeom>
+        </p:spPr>
+        <p:style>
+          <a:lnRef idx="1">
+            <a:schemeClr val="accent1"/>
+          </a:lnRef>
+          <a:fillRef idx="0">
+            <a:schemeClr val="accent1"/>
+          </a:fillRef>
+          <a:effectRef idx="0">
+            <a:schemeClr val="accent1"/>
+          </a:effectRef>
+          <a:fontRef idx="minor">
+            <a:schemeClr val="tx1"/>
+          </a:fontRef>
+        </p:style>
+      </p:cxnSp>
+      <p:sp>
+        <p:nvSpPr>
+          <p:cNvPr id="2" name="Rectangle 1">
+            <a:extLst>
+              <a:ext uri="{FF2B5EF4-FFF2-40B4-BE49-F238E27FC236}">
+                <a16:creationId xmlns:a16="http://schemas.microsoft.com/office/drawing/2014/main" id="{25BCE925-55E6-4AEB-8698-ACC57ECDDAB4}"/>
+              </a:ext>
+            </a:extLst>
+          </p:cNvPr>
+          <p:cNvSpPr/>
+          <p:nvPr/>
+        </p:nvSpPr>
+        <p:spPr>
+          <a:xfrm>
+            <a:off x="568960" y="1183569"/>
+            <a:ext cx="7626773" cy="2399347"/>
+          </a:xfrm>
+          <a:prstGeom prst="rect">
+            <a:avLst/>
+          </a:prstGeom>
+          <a:noFill/>
+          <a:ln w="28575"/>
+        </p:spPr>
+        <p:style>
+          <a:lnRef idx="2">
+            <a:schemeClr val="accent1">
+              <a:shade val="50000"/>
+            </a:schemeClr>
+          </a:lnRef>
+          <a:fillRef idx="1">
+            <a:schemeClr val="accent1"/>
+          </a:fillRef>
+          <a:effectRef idx="0">
+            <a:schemeClr val="accent1"/>
+          </a:effectRef>
+          <a:fontRef idx="minor">
+            <a:schemeClr val="lt1"/>
+          </a:fontRef>
+        </p:style>
+        <p:txBody>
+          <a:bodyPr rtlCol="0" anchor="ctr"/>
+          <a:lstStyle/>
+          <a:p>
+            <a:pPr algn="ctr"/>
+            <a:endParaRPr lang="en-US"/>
+          </a:p>
+        </p:txBody>
+      </p:sp>
+      <p:sp>
+        <p:nvSpPr>
+          <p:cNvPr id="49" name="Rectangle 48">
+            <a:extLst>
+              <a:ext uri="{FF2B5EF4-FFF2-40B4-BE49-F238E27FC236}">
+                <a16:creationId xmlns:a16="http://schemas.microsoft.com/office/drawing/2014/main" id="{7A32B201-4C59-4B44-A24E-20B17A844384}"/>
+              </a:ext>
+            </a:extLst>
+          </p:cNvPr>
+          <p:cNvSpPr/>
+          <p:nvPr/>
+        </p:nvSpPr>
+        <p:spPr>
+          <a:xfrm>
+            <a:off x="2821941" y="4054148"/>
+            <a:ext cx="5373792" cy="1493741"/>
+          </a:xfrm>
+          <a:prstGeom prst="rect">
+            <a:avLst/>
+          </a:prstGeom>
+          <a:noFill/>
+          <a:ln w="28575"/>
+        </p:spPr>
+        <p:style>
+          <a:lnRef idx="2">
+            <a:schemeClr val="accent1">
+              <a:shade val="50000"/>
+            </a:schemeClr>
+          </a:lnRef>
+          <a:fillRef idx="1">
+            <a:schemeClr val="accent1"/>
+          </a:fillRef>
+          <a:effectRef idx="0">
+            <a:schemeClr val="accent1"/>
+          </a:effectRef>
+          <a:fontRef idx="minor">
+            <a:schemeClr val="lt1"/>
+          </a:fontRef>
+        </p:style>
+        <p:txBody>
+          <a:bodyPr rtlCol="0" anchor="ctr"/>
+          <a:lstStyle/>
+          <a:p>
+            <a:pPr algn="ctr"/>
+            <a:endParaRPr lang="en-US"/>
+          </a:p>
+        </p:txBody>
+      </p:sp>
+      <p:sp>
+        <p:nvSpPr>
+          <p:cNvPr id="50" name="Triangle 17">
+            <a:extLst>
+              <a:ext uri="{FF2B5EF4-FFF2-40B4-BE49-F238E27FC236}">
+                <a16:creationId xmlns:a16="http://schemas.microsoft.com/office/drawing/2014/main" id="{6FD5EEAA-22F4-4EF8-96AF-2CA3CD269BAC}"/>
+              </a:ext>
+            </a:extLst>
+          </p:cNvPr>
+          <p:cNvSpPr/>
+          <p:nvPr/>
+        </p:nvSpPr>
+        <p:spPr>
+          <a:xfrm rot="10800000">
+            <a:off x="8696451" y="4123845"/>
+            <a:ext cx="505968" cy="369332"/>
+          </a:xfrm>
+          <a:prstGeom prst="triangle">
+            <a:avLst/>
+          </a:prstGeom>
+        </p:spPr>
+        <p:style>
+          <a:lnRef idx="2">
+            <a:schemeClr val="accent1">
+              <a:shade val="50000"/>
+            </a:schemeClr>
+          </a:lnRef>
+          <a:fillRef idx="1">
+            <a:schemeClr val="accent1"/>
+          </a:fillRef>
+          <a:effectRef idx="0">
+            <a:schemeClr val="accent1"/>
+          </a:effectRef>
+          <a:fontRef idx="minor">
+            <a:schemeClr val="lt1"/>
+          </a:fontRef>
+        </p:style>
+        <p:txBody>
+          <a:bodyPr rtlCol="0" anchor="ctr"/>
+          <a:lstStyle/>
+          <a:p>
+            <a:pPr algn="r"/>
+            <a:endParaRPr lang="en-US" dirty="0"/>
+          </a:p>
+        </p:txBody>
+      </p:sp>
+      <p:sp>
+        <p:nvSpPr>
+          <p:cNvPr id="51" name="TextBox 50">
+            <a:extLst>
+              <a:ext uri="{FF2B5EF4-FFF2-40B4-BE49-F238E27FC236}">
+                <a16:creationId xmlns:a16="http://schemas.microsoft.com/office/drawing/2014/main" id="{3FCB659D-D93C-4912-86E4-F1B1BD13D9B1}"/>
+              </a:ext>
+            </a:extLst>
+          </p:cNvPr>
+          <p:cNvSpPr txBox="1"/>
+          <p:nvPr/>
+        </p:nvSpPr>
+        <p:spPr>
+          <a:xfrm>
+            <a:off x="8666985" y="2722486"/>
+            <a:ext cx="1736854" cy="369332"/>
           </a:xfrm>
           <a:prstGeom prst="rect">
             <a:avLst/>
@@ -3744,22 +4472,142 @@
           <a:p>
             <a:pPr algn="ctr"/>
             <a:r>
-              <a:rPr lang="en-US" dirty="0" err="1"/>
-              <a:t>Gryo</a:t>
-            </a:r>
-            <a:r>
               <a:rPr lang="en-US" dirty="0"/>
-              <a:t>/Mag</a:t>
-            </a:r>
-          </a:p>
-        </p:txBody>
-      </p:sp>
-      <p:sp>
-        <p:nvSpPr>
-          <p:cNvPr id="14" name="TextBox 13">
-            <a:extLst>
-              <a:ext uri="{FF2B5EF4-FFF2-40B4-BE49-F238E27FC236}">
-                <a16:creationId xmlns:a16="http://schemas.microsoft.com/office/drawing/2014/main" id="{41B039F7-5875-AB40-9CE8-FBD7D610780E}"/>
+              <a:t>Torque Coils</a:t>
+            </a:r>
+          </a:p>
+        </p:txBody>
+      </p:sp>
+      <p:sp>
+        <p:nvSpPr>
+          <p:cNvPr id="52" name="Triangle 17">
+            <a:extLst>
+              <a:ext uri="{FF2B5EF4-FFF2-40B4-BE49-F238E27FC236}">
+                <a16:creationId xmlns:a16="http://schemas.microsoft.com/office/drawing/2014/main" id="{D40C8769-9337-413C-AB33-CB02C2121422}"/>
+              </a:ext>
+            </a:extLst>
+          </p:cNvPr>
+          <p:cNvSpPr/>
+          <p:nvPr/>
+        </p:nvSpPr>
+        <p:spPr>
+          <a:xfrm rot="10800000">
+            <a:off x="9627784" y="4123846"/>
+            <a:ext cx="505968" cy="369332"/>
+          </a:xfrm>
+          <a:prstGeom prst="triangle">
+            <a:avLst/>
+          </a:prstGeom>
+        </p:spPr>
+        <p:style>
+          <a:lnRef idx="2">
+            <a:schemeClr val="accent1">
+              <a:shade val="50000"/>
+            </a:schemeClr>
+          </a:lnRef>
+          <a:fillRef idx="1">
+            <a:schemeClr val="accent1"/>
+          </a:fillRef>
+          <a:effectRef idx="0">
+            <a:schemeClr val="accent1"/>
+          </a:effectRef>
+          <a:fontRef idx="minor">
+            <a:schemeClr val="lt1"/>
+          </a:fontRef>
+        </p:style>
+        <p:txBody>
+          <a:bodyPr rtlCol="0" anchor="ctr"/>
+          <a:lstStyle/>
+          <a:p>
+            <a:pPr algn="r"/>
+            <a:endParaRPr lang="en-US" dirty="0"/>
+          </a:p>
+        </p:txBody>
+      </p:sp>
+      <p:cxnSp>
+        <p:nvCxnSpPr>
+          <p:cNvPr id="31" name="Connector: Elbow 30">
+            <a:extLst>
+              <a:ext uri="{FF2B5EF4-FFF2-40B4-BE49-F238E27FC236}">
+                <a16:creationId xmlns:a16="http://schemas.microsoft.com/office/drawing/2014/main" id="{52669B9D-8976-4BD7-A80A-BAAA3828D92E}"/>
+              </a:ext>
+            </a:extLst>
+          </p:cNvPr>
+          <p:cNvCxnSpPr>
+            <a:stCxn id="39" idx="3"/>
+            <a:endCxn id="50" idx="0"/>
+          </p:cNvCxnSpPr>
+          <p:nvPr/>
+        </p:nvCxnSpPr>
+        <p:spPr>
+          <a:xfrm flipV="1">
+            <a:off x="8016240" y="4493177"/>
+            <a:ext cx="933195" cy="252984"/>
+          </a:xfrm>
+          <a:prstGeom prst="bentConnector2">
+            <a:avLst/>
+          </a:prstGeom>
+        </p:spPr>
+        <p:style>
+          <a:lnRef idx="1">
+            <a:schemeClr val="accent1"/>
+          </a:lnRef>
+          <a:fillRef idx="0">
+            <a:schemeClr val="accent1"/>
+          </a:fillRef>
+          <a:effectRef idx="0">
+            <a:schemeClr val="accent1"/>
+          </a:effectRef>
+          <a:fontRef idx="minor">
+            <a:schemeClr val="tx1"/>
+          </a:fontRef>
+        </p:style>
+      </p:cxnSp>
+      <p:cxnSp>
+        <p:nvCxnSpPr>
+          <p:cNvPr id="66" name="Connector: Elbow 65">
+            <a:extLst>
+              <a:ext uri="{FF2B5EF4-FFF2-40B4-BE49-F238E27FC236}">
+                <a16:creationId xmlns:a16="http://schemas.microsoft.com/office/drawing/2014/main" id="{098B11B7-299E-4B5D-A8CA-3893E2DA62C5}"/>
+              </a:ext>
+            </a:extLst>
+          </p:cNvPr>
+          <p:cNvCxnSpPr>
+            <a:cxnSpLocks/>
+            <a:endCxn id="52" idx="0"/>
+          </p:cNvCxnSpPr>
+          <p:nvPr/>
+        </p:nvCxnSpPr>
+        <p:spPr>
+          <a:xfrm flipV="1">
+            <a:off x="8016240" y="4493178"/>
+            <a:ext cx="1864528" cy="426736"/>
+          </a:xfrm>
+          <a:prstGeom prst="bentConnector2">
+            <a:avLst/>
+          </a:prstGeom>
+        </p:spPr>
+        <p:style>
+          <a:lnRef idx="1">
+            <a:schemeClr val="accent1"/>
+          </a:lnRef>
+          <a:fillRef idx="0">
+            <a:schemeClr val="accent1"/>
+          </a:fillRef>
+          <a:effectRef idx="0">
+            <a:schemeClr val="accent1"/>
+          </a:effectRef>
+          <a:fontRef idx="minor">
+            <a:schemeClr val="tx1"/>
+          </a:fontRef>
+        </p:style>
+      </p:cxnSp>
+      <p:sp>
+        <p:nvSpPr>
+          <p:cNvPr id="71" name="TextBox 70">
+            <a:extLst>
+              <a:ext uri="{FF2B5EF4-FFF2-40B4-BE49-F238E27FC236}">
+                <a16:creationId xmlns:a16="http://schemas.microsoft.com/office/drawing/2014/main" id="{D6F3E07F-E3D7-4FBA-874B-674DEB4D5164}"/>
               </a:ext>
             </a:extLst>
           </p:cNvPr>
@@ -3768,8 +4616,8 @@
         </p:nvSpPr>
         <p:spPr>
           <a:xfrm>
-            <a:off x="8381999" y="3835917"/>
-            <a:ext cx="1109472" cy="646331"/>
+            <a:off x="8682286" y="2053000"/>
+            <a:ext cx="1721553" cy="369332"/>
           </a:xfrm>
           <a:prstGeom prst="rect">
             <a:avLst/>
@@ -3790,17 +4638,17 @@
             <a:pPr algn="ctr"/>
             <a:r>
               <a:rPr lang="en-US" dirty="0"/>
-              <a:t>Torque Coils</a:t>
-            </a:r>
-          </a:p>
-        </p:txBody>
-      </p:sp>
-      <p:sp>
-        <p:nvSpPr>
-          <p:cNvPr id="15" name="TextBox 14">
-            <a:extLst>
-              <a:ext uri="{FF2B5EF4-FFF2-40B4-BE49-F238E27FC236}">
-                <a16:creationId xmlns:a16="http://schemas.microsoft.com/office/drawing/2014/main" id="{95AC9320-D6F3-4241-9010-D727BB13F47E}"/>
+              <a:t>Burn Wires</a:t>
+            </a:r>
+          </a:p>
+        </p:txBody>
+      </p:sp>
+      <p:sp>
+        <p:nvSpPr>
+          <p:cNvPr id="72" name="TextBox 71">
+            <a:extLst>
+              <a:ext uri="{FF2B5EF4-FFF2-40B4-BE49-F238E27FC236}">
+                <a16:creationId xmlns:a16="http://schemas.microsoft.com/office/drawing/2014/main" id="{77B90C5A-F3DA-477F-B76F-DE617917D901}"/>
               </a:ext>
             </a:extLst>
           </p:cNvPr>
@@ -3809,7 +4657,7 @@
         </p:nvSpPr>
         <p:spPr>
           <a:xfrm>
-            <a:off x="8381999" y="2988495"/>
+            <a:off x="3316440" y="1433069"/>
             <a:ext cx="1109472" cy="369332"/>
           </a:xfrm>
           <a:prstGeom prst="rect">
@@ -3831,31 +4679,79 @@
             <a:pPr algn="ctr"/>
             <a:r>
               <a:rPr lang="en-US" dirty="0"/>
-              <a:t>H-Bridge</a:t>
-            </a:r>
+              <a:t>Batteries</a:t>
+            </a:r>
+          </a:p>
+        </p:txBody>
+      </p:sp>
+      <p:sp>
+        <p:nvSpPr>
+          <p:cNvPr id="79" name="Rectangle 78">
+            <a:extLst>
+              <a:ext uri="{FF2B5EF4-FFF2-40B4-BE49-F238E27FC236}">
+                <a16:creationId xmlns:a16="http://schemas.microsoft.com/office/drawing/2014/main" id="{6F6011F3-4274-418C-A01E-210CC3608DE0}"/>
+              </a:ext>
+            </a:extLst>
+          </p:cNvPr>
+          <p:cNvSpPr/>
+          <p:nvPr/>
+        </p:nvSpPr>
+        <p:spPr>
+          <a:xfrm>
+            <a:off x="8486713" y="1183569"/>
+            <a:ext cx="2159719" cy="2399347"/>
+          </a:xfrm>
+          <a:prstGeom prst="rect">
+            <a:avLst/>
+          </a:prstGeom>
+          <a:noFill/>
+          <a:ln w="28575"/>
+        </p:spPr>
+        <p:style>
+          <a:lnRef idx="2">
+            <a:schemeClr val="accent1">
+              <a:shade val="50000"/>
+            </a:schemeClr>
+          </a:lnRef>
+          <a:fillRef idx="1">
+            <a:schemeClr val="accent1"/>
+          </a:fillRef>
+          <a:effectRef idx="0">
+            <a:schemeClr val="accent1"/>
+          </a:effectRef>
+          <a:fontRef idx="minor">
+            <a:schemeClr val="lt1"/>
+          </a:fontRef>
+        </p:style>
+        <p:txBody>
+          <a:bodyPr rtlCol="0" anchor="ctr"/>
+          <a:lstStyle/>
+          <a:p>
+            <a:pPr algn="ctr"/>
+            <a:endParaRPr lang="en-US"/>
           </a:p>
         </p:txBody>
       </p:sp>
       <p:cxnSp>
         <p:nvCxnSpPr>
-          <p:cNvPr id="17" name="Straight Connector 16">
-            <a:extLst>
-              <a:ext uri="{FF2B5EF4-FFF2-40B4-BE49-F238E27FC236}">
-                <a16:creationId xmlns:a16="http://schemas.microsoft.com/office/drawing/2014/main" id="{0E8BA344-F30E-024E-A720-186375E1E47C}"/>
+          <p:cNvPr id="61" name="Straight Connector 60">
+            <a:extLst>
+              <a:ext uri="{FF2B5EF4-FFF2-40B4-BE49-F238E27FC236}">
+                <a16:creationId xmlns:a16="http://schemas.microsoft.com/office/drawing/2014/main" id="{063034E2-E6E3-4F58-958E-B5320C9067B7}"/>
               </a:ext>
             </a:extLst>
           </p:cNvPr>
           <p:cNvCxnSpPr>
             <a:cxnSpLocks/>
-            <a:stCxn id="5" idx="2"/>
-            <a:endCxn id="4" idx="0"/>
+            <a:stCxn id="8" idx="3"/>
+            <a:endCxn id="9" idx="1"/>
           </p:cNvCxnSpPr>
           <p:nvPr/>
         </p:nvCxnSpPr>
         <p:spPr>
-          <a:xfrm>
-            <a:off x="1353312" y="709164"/>
-            <a:ext cx="0" cy="551164"/>
+          <a:xfrm flipV="1">
+            <a:off x="6254496" y="1615493"/>
+            <a:ext cx="2427791" cy="2242"/>
           </a:xfrm>
           <a:prstGeom prst="line">
             <a:avLst/>
@@ -3876,609 +4772,12 @@
           </a:fontRef>
         </p:style>
       </p:cxnSp>
-      <p:cxnSp>
-        <p:nvCxnSpPr>
-          <p:cNvPr id="20" name="Straight Connector 19">
-            <a:extLst>
-              <a:ext uri="{FF2B5EF4-FFF2-40B4-BE49-F238E27FC236}">
-                <a16:creationId xmlns:a16="http://schemas.microsoft.com/office/drawing/2014/main" id="{AA29920D-C1CB-2440-B7E8-1E8572CB3B87}"/>
-              </a:ext>
-            </a:extLst>
-          </p:cNvPr>
-          <p:cNvCxnSpPr>
-            <a:cxnSpLocks/>
-            <a:stCxn id="4" idx="2"/>
-          </p:cNvCxnSpPr>
-          <p:nvPr/>
-        </p:nvCxnSpPr>
-        <p:spPr>
-          <a:xfrm>
-            <a:off x="1353312" y="1906659"/>
-            <a:ext cx="0" cy="1266502"/>
-          </a:xfrm>
-          <a:prstGeom prst="line">
-            <a:avLst/>
-          </a:prstGeom>
-        </p:spPr>
-        <p:style>
-          <a:lnRef idx="1">
-            <a:schemeClr val="accent1"/>
-          </a:lnRef>
-          <a:fillRef idx="0">
-            <a:schemeClr val="accent1"/>
-          </a:fillRef>
-          <a:effectRef idx="0">
-            <a:schemeClr val="accent1"/>
-          </a:effectRef>
-          <a:fontRef idx="minor">
-            <a:schemeClr val="tx1"/>
-          </a:fontRef>
-        </p:style>
-      </p:cxnSp>
-      <p:cxnSp>
-        <p:nvCxnSpPr>
-          <p:cNvPr id="23" name="Straight Connector 22">
-            <a:extLst>
-              <a:ext uri="{FF2B5EF4-FFF2-40B4-BE49-F238E27FC236}">
-                <a16:creationId xmlns:a16="http://schemas.microsoft.com/office/drawing/2014/main" id="{41D76BA0-132E-484B-8E02-E7F815A5FDA3}"/>
-              </a:ext>
-            </a:extLst>
-          </p:cNvPr>
-          <p:cNvCxnSpPr>
-            <a:cxnSpLocks/>
-            <a:endCxn id="6" idx="1"/>
-          </p:cNvCxnSpPr>
-          <p:nvPr/>
-        </p:nvCxnSpPr>
-        <p:spPr>
-          <a:xfrm>
-            <a:off x="1353312" y="3156493"/>
-            <a:ext cx="3791712" cy="16668"/>
-          </a:xfrm>
-          <a:prstGeom prst="line">
-            <a:avLst/>
-          </a:prstGeom>
-        </p:spPr>
-        <p:style>
-          <a:lnRef idx="1">
-            <a:schemeClr val="accent1"/>
-          </a:lnRef>
-          <a:fillRef idx="0">
-            <a:schemeClr val="accent1"/>
-          </a:fillRef>
-          <a:effectRef idx="0">
-            <a:schemeClr val="accent1"/>
-          </a:effectRef>
-          <a:fontRef idx="minor">
-            <a:schemeClr val="tx1"/>
-          </a:fontRef>
-        </p:style>
-      </p:cxnSp>
-      <p:cxnSp>
-        <p:nvCxnSpPr>
-          <p:cNvPr id="27" name="Straight Connector 26">
-            <a:extLst>
-              <a:ext uri="{FF2B5EF4-FFF2-40B4-BE49-F238E27FC236}">
-                <a16:creationId xmlns:a16="http://schemas.microsoft.com/office/drawing/2014/main" id="{5822A046-8736-BB40-80F3-50D106FAF1BC}"/>
-              </a:ext>
-            </a:extLst>
-          </p:cNvPr>
-          <p:cNvCxnSpPr>
-            <a:cxnSpLocks/>
-            <a:stCxn id="7" idx="2"/>
-          </p:cNvCxnSpPr>
-          <p:nvPr/>
-        </p:nvCxnSpPr>
-        <p:spPr>
-          <a:xfrm>
-            <a:off x="4035552" y="2804314"/>
-            <a:ext cx="1109472" cy="184181"/>
-          </a:xfrm>
-          <a:prstGeom prst="line">
-            <a:avLst/>
-          </a:prstGeom>
-        </p:spPr>
-        <p:style>
-          <a:lnRef idx="1">
-            <a:schemeClr val="accent1"/>
-          </a:lnRef>
-          <a:fillRef idx="0">
-            <a:schemeClr val="accent1"/>
-          </a:fillRef>
-          <a:effectRef idx="0">
-            <a:schemeClr val="accent1"/>
-          </a:effectRef>
-          <a:fontRef idx="minor">
-            <a:schemeClr val="tx1"/>
-          </a:fontRef>
-        </p:style>
-      </p:cxnSp>
-      <p:cxnSp>
-        <p:nvCxnSpPr>
-          <p:cNvPr id="30" name="Straight Connector 29">
-            <a:extLst>
-              <a:ext uri="{FF2B5EF4-FFF2-40B4-BE49-F238E27FC236}">
-                <a16:creationId xmlns:a16="http://schemas.microsoft.com/office/drawing/2014/main" id="{0376AF38-8A4B-2E4B-AC94-933A0156BDAC}"/>
-              </a:ext>
-            </a:extLst>
-          </p:cNvPr>
-          <p:cNvCxnSpPr>
-            <a:cxnSpLocks/>
-            <a:stCxn id="4" idx="3"/>
-            <a:endCxn id="8" idx="1"/>
-          </p:cNvCxnSpPr>
-          <p:nvPr/>
-        </p:nvCxnSpPr>
-        <p:spPr>
-          <a:xfrm>
-            <a:off x="1908048" y="1583494"/>
-            <a:ext cx="3236976" cy="34241"/>
-          </a:xfrm>
-          <a:prstGeom prst="line">
-            <a:avLst/>
-          </a:prstGeom>
-        </p:spPr>
-        <p:style>
-          <a:lnRef idx="1">
-            <a:schemeClr val="accent1"/>
-          </a:lnRef>
-          <a:fillRef idx="0">
-            <a:schemeClr val="accent1"/>
-          </a:fillRef>
-          <a:effectRef idx="0">
-            <a:schemeClr val="accent1"/>
-          </a:effectRef>
-          <a:fontRef idx="minor">
-            <a:schemeClr val="tx1"/>
-          </a:fontRef>
-        </p:style>
-      </p:cxnSp>
-      <p:cxnSp>
-        <p:nvCxnSpPr>
-          <p:cNvPr id="40" name="Straight Connector 39">
-            <a:extLst>
-              <a:ext uri="{FF2B5EF4-FFF2-40B4-BE49-F238E27FC236}">
-                <a16:creationId xmlns:a16="http://schemas.microsoft.com/office/drawing/2014/main" id="{33F1D104-0B59-4147-8205-1724CCD3457F}"/>
-              </a:ext>
-            </a:extLst>
-          </p:cNvPr>
-          <p:cNvCxnSpPr>
-            <a:cxnSpLocks/>
-            <a:stCxn id="7" idx="3"/>
-            <a:endCxn id="8" idx="1"/>
-          </p:cNvCxnSpPr>
-          <p:nvPr/>
-        </p:nvCxnSpPr>
-        <p:spPr>
-          <a:xfrm flipV="1">
-            <a:off x="4590288" y="1617735"/>
-            <a:ext cx="554736" cy="863414"/>
-          </a:xfrm>
-          <a:prstGeom prst="line">
-            <a:avLst/>
-          </a:prstGeom>
-        </p:spPr>
-        <p:style>
-          <a:lnRef idx="1">
-            <a:schemeClr val="accent1"/>
-          </a:lnRef>
-          <a:fillRef idx="0">
-            <a:schemeClr val="accent1"/>
-          </a:fillRef>
-          <a:effectRef idx="0">
-            <a:schemeClr val="accent1"/>
-          </a:effectRef>
-          <a:fontRef idx="minor">
-            <a:schemeClr val="tx1"/>
-          </a:fontRef>
-        </p:style>
-      </p:cxnSp>
-      <p:cxnSp>
-        <p:nvCxnSpPr>
-          <p:cNvPr id="44" name="Straight Connector 43">
-            <a:extLst>
-              <a:ext uri="{FF2B5EF4-FFF2-40B4-BE49-F238E27FC236}">
-                <a16:creationId xmlns:a16="http://schemas.microsoft.com/office/drawing/2014/main" id="{41E0E646-7810-B543-9776-A93B917E0DFB}"/>
-              </a:ext>
-            </a:extLst>
-          </p:cNvPr>
-          <p:cNvCxnSpPr>
-            <a:cxnSpLocks/>
-            <a:stCxn id="8" idx="3"/>
-            <a:endCxn id="10" idx="1"/>
-          </p:cNvCxnSpPr>
-          <p:nvPr/>
-        </p:nvCxnSpPr>
-        <p:spPr>
-          <a:xfrm>
-            <a:off x="6254496" y="1617735"/>
-            <a:ext cx="1207008" cy="0"/>
-          </a:xfrm>
-          <a:prstGeom prst="line">
-            <a:avLst/>
-          </a:prstGeom>
-        </p:spPr>
-        <p:style>
-          <a:lnRef idx="1">
-            <a:schemeClr val="accent1"/>
-          </a:lnRef>
-          <a:fillRef idx="0">
-            <a:schemeClr val="accent1"/>
-          </a:fillRef>
-          <a:effectRef idx="0">
-            <a:schemeClr val="accent1"/>
-          </a:effectRef>
-          <a:fontRef idx="minor">
-            <a:schemeClr val="tx1"/>
-          </a:fontRef>
-        </p:style>
-      </p:cxnSp>
-      <p:cxnSp>
-        <p:nvCxnSpPr>
-          <p:cNvPr id="46" name="Straight Connector 45">
-            <a:extLst>
-              <a:ext uri="{FF2B5EF4-FFF2-40B4-BE49-F238E27FC236}">
-                <a16:creationId xmlns:a16="http://schemas.microsoft.com/office/drawing/2014/main" id="{0C48A716-9E8B-EA48-A148-B9B7B85DCE99}"/>
-              </a:ext>
-            </a:extLst>
-          </p:cNvPr>
-          <p:cNvCxnSpPr>
-            <a:cxnSpLocks/>
-            <a:stCxn id="8" idx="0"/>
-            <a:endCxn id="9" idx="2"/>
-          </p:cNvCxnSpPr>
-          <p:nvPr/>
-        </p:nvCxnSpPr>
-        <p:spPr>
-          <a:xfrm flipV="1">
-            <a:off x="5699760" y="814237"/>
-            <a:ext cx="0" cy="618832"/>
-          </a:xfrm>
-          <a:prstGeom prst="line">
-            <a:avLst/>
-          </a:prstGeom>
-        </p:spPr>
-        <p:style>
-          <a:lnRef idx="1">
-            <a:schemeClr val="accent1"/>
-          </a:lnRef>
-          <a:fillRef idx="0">
-            <a:schemeClr val="accent1"/>
-          </a:fillRef>
-          <a:effectRef idx="0">
-            <a:schemeClr val="accent1"/>
-          </a:effectRef>
-          <a:fontRef idx="minor">
-            <a:schemeClr val="tx1"/>
-          </a:fontRef>
-        </p:style>
-      </p:cxnSp>
-      <p:cxnSp>
-        <p:nvCxnSpPr>
-          <p:cNvPr id="54" name="Straight Connector 53">
-            <a:extLst>
-              <a:ext uri="{FF2B5EF4-FFF2-40B4-BE49-F238E27FC236}">
-                <a16:creationId xmlns:a16="http://schemas.microsoft.com/office/drawing/2014/main" id="{0AB640FA-7521-F148-9E2C-F16253D0FD5F}"/>
-              </a:ext>
-            </a:extLst>
-          </p:cNvPr>
-          <p:cNvCxnSpPr>
-            <a:cxnSpLocks/>
-            <a:stCxn id="8" idx="2"/>
-            <a:endCxn id="6" idx="0"/>
-          </p:cNvCxnSpPr>
-          <p:nvPr/>
-        </p:nvCxnSpPr>
-        <p:spPr>
-          <a:xfrm>
-            <a:off x="5699760" y="1802401"/>
-            <a:ext cx="0" cy="1186094"/>
-          </a:xfrm>
-          <a:prstGeom prst="line">
-            <a:avLst/>
-          </a:prstGeom>
-        </p:spPr>
-        <p:style>
-          <a:lnRef idx="1">
-            <a:schemeClr val="accent1"/>
-          </a:lnRef>
-          <a:fillRef idx="0">
-            <a:schemeClr val="accent1"/>
-          </a:fillRef>
-          <a:effectRef idx="0">
-            <a:schemeClr val="accent1"/>
-          </a:effectRef>
-          <a:fontRef idx="minor">
-            <a:schemeClr val="tx1"/>
-          </a:fontRef>
-        </p:style>
-      </p:cxnSp>
-      <p:cxnSp>
-        <p:nvCxnSpPr>
-          <p:cNvPr id="65" name="Straight Connector 64">
-            <a:extLst>
-              <a:ext uri="{FF2B5EF4-FFF2-40B4-BE49-F238E27FC236}">
-                <a16:creationId xmlns:a16="http://schemas.microsoft.com/office/drawing/2014/main" id="{8D838D16-38EC-2141-8F41-F55A7264DEB5}"/>
-              </a:ext>
-            </a:extLst>
-          </p:cNvPr>
-          <p:cNvCxnSpPr>
-            <a:cxnSpLocks/>
-            <a:stCxn id="6" idx="2"/>
-            <a:endCxn id="11" idx="0"/>
-          </p:cNvCxnSpPr>
-          <p:nvPr/>
-        </p:nvCxnSpPr>
-        <p:spPr>
-          <a:xfrm>
-            <a:off x="5699760" y="3357827"/>
-            <a:ext cx="0" cy="1065168"/>
-          </a:xfrm>
-          <a:prstGeom prst="line">
-            <a:avLst/>
-          </a:prstGeom>
-        </p:spPr>
-        <p:style>
-          <a:lnRef idx="1">
-            <a:schemeClr val="accent1"/>
-          </a:lnRef>
-          <a:fillRef idx="0">
-            <a:schemeClr val="accent1"/>
-          </a:fillRef>
-          <a:effectRef idx="0">
-            <a:schemeClr val="accent1"/>
-          </a:effectRef>
-          <a:fontRef idx="minor">
-            <a:schemeClr val="tx1"/>
-          </a:fontRef>
-        </p:style>
-      </p:cxnSp>
-      <p:cxnSp>
-        <p:nvCxnSpPr>
-          <p:cNvPr id="69" name="Straight Connector 68">
-            <a:extLst>
-              <a:ext uri="{FF2B5EF4-FFF2-40B4-BE49-F238E27FC236}">
-                <a16:creationId xmlns:a16="http://schemas.microsoft.com/office/drawing/2014/main" id="{276E0EFF-76B9-BD4C-B9F5-390D8F58DCCF}"/>
-              </a:ext>
-            </a:extLst>
-          </p:cNvPr>
-          <p:cNvCxnSpPr>
-            <a:cxnSpLocks/>
-            <a:stCxn id="12" idx="3"/>
-            <a:endCxn id="11" idx="1"/>
-          </p:cNvCxnSpPr>
-          <p:nvPr/>
-        </p:nvCxnSpPr>
-        <p:spPr>
-          <a:xfrm>
-            <a:off x="4233672" y="4746161"/>
-            <a:ext cx="841248" cy="0"/>
-          </a:xfrm>
-          <a:prstGeom prst="line">
-            <a:avLst/>
-          </a:prstGeom>
-        </p:spPr>
-        <p:style>
-          <a:lnRef idx="1">
-            <a:schemeClr val="accent1"/>
-          </a:lnRef>
-          <a:fillRef idx="0">
-            <a:schemeClr val="accent1"/>
-          </a:fillRef>
-          <a:effectRef idx="0">
-            <a:schemeClr val="accent1"/>
-          </a:effectRef>
-          <a:fontRef idx="minor">
-            <a:schemeClr val="tx1"/>
-          </a:fontRef>
-        </p:style>
-      </p:cxnSp>
-      <p:cxnSp>
-        <p:nvCxnSpPr>
-          <p:cNvPr id="73" name="Straight Connector 72">
-            <a:extLst>
-              <a:ext uri="{FF2B5EF4-FFF2-40B4-BE49-F238E27FC236}">
-                <a16:creationId xmlns:a16="http://schemas.microsoft.com/office/drawing/2014/main" id="{D1229C0E-B88E-B34B-B96B-6BC21E654F00}"/>
-              </a:ext>
-            </a:extLst>
-          </p:cNvPr>
-          <p:cNvCxnSpPr>
-            <a:cxnSpLocks/>
-            <a:stCxn id="15" idx="2"/>
-            <a:endCxn id="14" idx="0"/>
-          </p:cNvCxnSpPr>
-          <p:nvPr/>
-        </p:nvCxnSpPr>
-        <p:spPr>
-          <a:xfrm>
-            <a:off x="8936735" y="3357827"/>
-            <a:ext cx="0" cy="478090"/>
-          </a:xfrm>
-          <a:prstGeom prst="line">
-            <a:avLst/>
-          </a:prstGeom>
-        </p:spPr>
-        <p:style>
-          <a:lnRef idx="1">
-            <a:schemeClr val="accent1"/>
-          </a:lnRef>
-          <a:fillRef idx="0">
-            <a:schemeClr val="accent1"/>
-          </a:fillRef>
-          <a:effectRef idx="0">
-            <a:schemeClr val="accent1"/>
-          </a:effectRef>
-          <a:fontRef idx="minor">
-            <a:schemeClr val="tx1"/>
-          </a:fontRef>
-        </p:style>
-      </p:cxnSp>
-      <p:cxnSp>
-        <p:nvCxnSpPr>
-          <p:cNvPr id="76" name="Straight Connector 75">
-            <a:extLst>
-              <a:ext uri="{FF2B5EF4-FFF2-40B4-BE49-F238E27FC236}">
-                <a16:creationId xmlns:a16="http://schemas.microsoft.com/office/drawing/2014/main" id="{08388745-68E5-DD4A-A5DA-F86FD5C8D987}"/>
-              </a:ext>
-            </a:extLst>
-          </p:cNvPr>
-          <p:cNvCxnSpPr>
-            <a:cxnSpLocks/>
-            <a:stCxn id="6" idx="3"/>
-            <a:endCxn id="15" idx="1"/>
-          </p:cNvCxnSpPr>
-          <p:nvPr/>
-        </p:nvCxnSpPr>
-        <p:spPr>
-          <a:xfrm>
-            <a:off x="6254496" y="3173161"/>
-            <a:ext cx="2127503" cy="0"/>
-          </a:xfrm>
-          <a:prstGeom prst="line">
-            <a:avLst/>
-          </a:prstGeom>
-        </p:spPr>
-        <p:style>
-          <a:lnRef idx="1">
-            <a:schemeClr val="accent1"/>
-          </a:lnRef>
-          <a:fillRef idx="0">
-            <a:schemeClr val="accent1"/>
-          </a:fillRef>
-          <a:effectRef idx="0">
-            <a:schemeClr val="accent1"/>
-          </a:effectRef>
-          <a:fontRef idx="minor">
-            <a:schemeClr val="tx1"/>
-          </a:fontRef>
-        </p:style>
-      </p:cxnSp>
-      <p:cxnSp>
-        <p:nvCxnSpPr>
-          <p:cNvPr id="81" name="Straight Connector 80">
-            <a:extLst>
-              <a:ext uri="{FF2B5EF4-FFF2-40B4-BE49-F238E27FC236}">
-                <a16:creationId xmlns:a16="http://schemas.microsoft.com/office/drawing/2014/main" id="{9BF10A7E-D237-3D46-9487-1DCDBD4AB000}"/>
-              </a:ext>
-            </a:extLst>
-          </p:cNvPr>
-          <p:cNvCxnSpPr>
-            <a:cxnSpLocks/>
-            <a:stCxn id="8" idx="3"/>
-            <a:endCxn id="15" idx="0"/>
-          </p:cNvCxnSpPr>
-          <p:nvPr/>
-        </p:nvCxnSpPr>
-        <p:spPr>
-          <a:xfrm>
-            <a:off x="6254496" y="1617735"/>
-            <a:ext cx="2682239" cy="1370760"/>
-          </a:xfrm>
-          <a:prstGeom prst="line">
-            <a:avLst/>
-          </a:prstGeom>
-        </p:spPr>
-        <p:style>
-          <a:lnRef idx="1">
-            <a:schemeClr val="accent1"/>
-          </a:lnRef>
-          <a:fillRef idx="0">
-            <a:schemeClr val="accent1"/>
-          </a:fillRef>
-          <a:effectRef idx="0">
-            <a:schemeClr val="accent1"/>
-          </a:effectRef>
-          <a:fontRef idx="minor">
-            <a:schemeClr val="tx1"/>
-          </a:fontRef>
-        </p:style>
-      </p:cxnSp>
-      <p:cxnSp>
-        <p:nvCxnSpPr>
-          <p:cNvPr id="84" name="Straight Connector 83">
-            <a:extLst>
-              <a:ext uri="{FF2B5EF4-FFF2-40B4-BE49-F238E27FC236}">
-                <a16:creationId xmlns:a16="http://schemas.microsoft.com/office/drawing/2014/main" id="{DB563902-D49D-B148-974F-C994AED5665B}"/>
-              </a:ext>
-            </a:extLst>
-          </p:cNvPr>
-          <p:cNvCxnSpPr>
-            <a:cxnSpLocks/>
-            <a:stCxn id="6" idx="0"/>
-            <a:endCxn id="13" idx="1"/>
-          </p:cNvCxnSpPr>
-          <p:nvPr/>
-        </p:nvCxnSpPr>
-        <p:spPr>
-          <a:xfrm flipV="1">
-            <a:off x="5699760" y="2660553"/>
-            <a:ext cx="624840" cy="327942"/>
-          </a:xfrm>
-          <a:prstGeom prst="line">
-            <a:avLst/>
-          </a:prstGeom>
-        </p:spPr>
-        <p:style>
-          <a:lnRef idx="1">
-            <a:schemeClr val="accent1"/>
-          </a:lnRef>
-          <a:fillRef idx="0">
-            <a:schemeClr val="accent1"/>
-          </a:fillRef>
-          <a:effectRef idx="0">
-            <a:schemeClr val="accent1"/>
-          </a:effectRef>
-          <a:fontRef idx="minor">
-            <a:schemeClr val="tx1"/>
-          </a:fontRef>
-        </p:style>
-      </p:cxnSp>
-      <p:cxnSp>
-        <p:nvCxnSpPr>
-          <p:cNvPr id="90" name="Straight Connector 89">
-            <a:extLst>
-              <a:ext uri="{FF2B5EF4-FFF2-40B4-BE49-F238E27FC236}">
-                <a16:creationId xmlns:a16="http://schemas.microsoft.com/office/drawing/2014/main" id="{7162B94E-D28D-3346-B3F0-0B2E5BE16D44}"/>
-              </a:ext>
-            </a:extLst>
-          </p:cNvPr>
-          <p:cNvCxnSpPr>
-            <a:cxnSpLocks/>
-            <a:stCxn id="8" idx="2"/>
-            <a:endCxn id="13" idx="1"/>
-          </p:cNvCxnSpPr>
-          <p:nvPr/>
-        </p:nvCxnSpPr>
-        <p:spPr>
-          <a:xfrm>
-            <a:off x="5699760" y="1802401"/>
-            <a:ext cx="624840" cy="858152"/>
-          </a:xfrm>
-          <a:prstGeom prst="line">
-            <a:avLst/>
-          </a:prstGeom>
-        </p:spPr>
-        <p:style>
-          <a:lnRef idx="1">
-            <a:schemeClr val="accent1"/>
-          </a:lnRef>
-          <a:fillRef idx="0">
-            <a:schemeClr val="accent1"/>
-          </a:fillRef>
-          <a:effectRef idx="0">
-            <a:schemeClr val="accent1"/>
-          </a:effectRef>
-          <a:fontRef idx="minor">
-            <a:schemeClr val="tx1"/>
-          </a:fontRef>
-        </p:style>
-      </p:cxnSp>
-      <p:sp>
-        <p:nvSpPr>
-          <p:cNvPr id="93" name="TextBox 92">
-            <a:extLst>
-              <a:ext uri="{FF2B5EF4-FFF2-40B4-BE49-F238E27FC236}">
-                <a16:creationId xmlns:a16="http://schemas.microsoft.com/office/drawing/2014/main" id="{96B5813C-ED76-2344-AAEB-A8B4FCC94C62}"/>
+      <p:sp>
+        <p:nvSpPr>
+          <p:cNvPr id="85" name="TextBox 84">
+            <a:extLst>
+              <a:ext uri="{FF2B5EF4-FFF2-40B4-BE49-F238E27FC236}">
+                <a16:creationId xmlns:a16="http://schemas.microsoft.com/office/drawing/2014/main" id="{E45AF5A6-5E7C-45AF-9DA3-DF3663645E29}"/>
               </a:ext>
             </a:extLst>
           </p:cNvPr>
@@ -4487,326 +4786,8 @@
         </p:nvSpPr>
         <p:spPr>
           <a:xfrm>
-            <a:off x="6633308" y="1386903"/>
-            <a:ext cx="502061" cy="276999"/>
-          </a:xfrm>
-          <a:prstGeom prst="rect">
-            <a:avLst/>
-          </a:prstGeom>
-          <a:noFill/>
-        </p:spPr>
-        <p:txBody>
-          <a:bodyPr wrap="none" rtlCol="0">
-            <a:spAutoFit/>
-          </a:bodyPr>
-          <a:lstStyle/>
-          <a:p>
-            <a:r>
-              <a:rPr lang="en-US" sz="1200" dirty="0"/>
-              <a:t>3.6 V</a:t>
-            </a:r>
-          </a:p>
-        </p:txBody>
-      </p:sp>
-      <p:sp>
-        <p:nvSpPr>
-          <p:cNvPr id="94" name="TextBox 93">
-            <a:extLst>
-              <a:ext uri="{FF2B5EF4-FFF2-40B4-BE49-F238E27FC236}">
-                <a16:creationId xmlns:a16="http://schemas.microsoft.com/office/drawing/2014/main" id="{221A182C-1F6D-DC46-8E9F-56227BF97B5D}"/>
-              </a:ext>
-            </a:extLst>
-          </p:cNvPr>
-          <p:cNvSpPr txBox="1"/>
-          <p:nvPr/>
-        </p:nvSpPr>
-        <p:spPr>
-          <a:xfrm>
-            <a:off x="5692570" y="991785"/>
-            <a:ext cx="742832" cy="276999"/>
-          </a:xfrm>
-          <a:prstGeom prst="rect">
-            <a:avLst/>
-          </a:prstGeom>
-          <a:noFill/>
-        </p:spPr>
-        <p:txBody>
-          <a:bodyPr wrap="none" rtlCol="0">
-            <a:spAutoFit/>
-          </a:bodyPr>
-          <a:lstStyle/>
-          <a:p>
-            <a:r>
-              <a:rPr lang="en-US" sz="1200" dirty="0"/>
-              <a:t>8.4V, 6W</a:t>
-            </a:r>
-          </a:p>
-        </p:txBody>
-      </p:sp>
-      <p:sp>
-        <p:nvSpPr>
-          <p:cNvPr id="95" name="TextBox 94">
-            <a:extLst>
-              <a:ext uri="{FF2B5EF4-FFF2-40B4-BE49-F238E27FC236}">
-                <a16:creationId xmlns:a16="http://schemas.microsoft.com/office/drawing/2014/main" id="{BFA3E794-535A-D74D-A0A6-CEBA4CDC0141}"/>
-              </a:ext>
-            </a:extLst>
-          </p:cNvPr>
-          <p:cNvSpPr txBox="1"/>
-          <p:nvPr/>
-        </p:nvSpPr>
-        <p:spPr>
-          <a:xfrm>
-            <a:off x="3124200" y="1354330"/>
-            <a:ext cx="466794" cy="276999"/>
-          </a:xfrm>
-          <a:prstGeom prst="rect">
-            <a:avLst/>
-          </a:prstGeom>
-          <a:noFill/>
-        </p:spPr>
-        <p:txBody>
-          <a:bodyPr wrap="none" rtlCol="0">
-            <a:spAutoFit/>
-          </a:bodyPr>
-          <a:lstStyle/>
-          <a:p>
-            <a:r>
-              <a:rPr lang="en-US" sz="1200" dirty="0"/>
-              <a:t>3.3V</a:t>
-            </a:r>
-          </a:p>
-        </p:txBody>
-      </p:sp>
-      <p:sp>
-        <p:nvSpPr>
-          <p:cNvPr id="97" name="TextBox 96">
-            <a:extLst>
-              <a:ext uri="{FF2B5EF4-FFF2-40B4-BE49-F238E27FC236}">
-                <a16:creationId xmlns:a16="http://schemas.microsoft.com/office/drawing/2014/main" id="{667C7E41-BEA0-BD42-BB8D-F56F3391F833}"/>
-              </a:ext>
-            </a:extLst>
-          </p:cNvPr>
-          <p:cNvSpPr txBox="1"/>
-          <p:nvPr/>
-        </p:nvSpPr>
-        <p:spPr>
-          <a:xfrm>
-            <a:off x="4479895" y="1802401"/>
-            <a:ext cx="385042" cy="276999"/>
-          </a:xfrm>
-          <a:prstGeom prst="rect">
-            <a:avLst/>
-          </a:prstGeom>
-          <a:noFill/>
-        </p:spPr>
-        <p:txBody>
-          <a:bodyPr wrap="none" rtlCol="0">
-            <a:spAutoFit/>
-          </a:bodyPr>
-          <a:lstStyle/>
-          <a:p>
-            <a:r>
-              <a:rPr lang="en-US" sz="1200" dirty="0"/>
-              <a:t>5 V</a:t>
-            </a:r>
-          </a:p>
-        </p:txBody>
-      </p:sp>
-      <p:sp>
-        <p:nvSpPr>
-          <p:cNvPr id="98" name="TextBox 97">
-            <a:extLst>
-              <a:ext uri="{FF2B5EF4-FFF2-40B4-BE49-F238E27FC236}">
-                <a16:creationId xmlns:a16="http://schemas.microsoft.com/office/drawing/2014/main" id="{D9F67247-5B14-E64D-BDD4-3014CC09751B}"/>
-              </a:ext>
-            </a:extLst>
-          </p:cNvPr>
-          <p:cNvSpPr txBox="1"/>
-          <p:nvPr/>
-        </p:nvSpPr>
-        <p:spPr>
-          <a:xfrm>
-            <a:off x="5933341" y="1991382"/>
-            <a:ext cx="502061" cy="276999"/>
-          </a:xfrm>
-          <a:prstGeom prst="rect">
-            <a:avLst/>
-          </a:prstGeom>
-          <a:noFill/>
-        </p:spPr>
-        <p:txBody>
-          <a:bodyPr wrap="none" rtlCol="0">
-            <a:spAutoFit/>
-          </a:bodyPr>
-          <a:lstStyle/>
-          <a:p>
-            <a:r>
-              <a:rPr lang="en-US" sz="1200" dirty="0"/>
-              <a:t>3.3 V</a:t>
-            </a:r>
-          </a:p>
-        </p:txBody>
-      </p:sp>
-      <p:sp>
-        <p:nvSpPr>
-          <p:cNvPr id="99" name="TextBox 98">
-            <a:extLst>
-              <a:ext uri="{FF2B5EF4-FFF2-40B4-BE49-F238E27FC236}">
-                <a16:creationId xmlns:a16="http://schemas.microsoft.com/office/drawing/2014/main" id="{2414F070-E06A-F04D-BB8E-483643B5EF71}"/>
-              </a:ext>
-            </a:extLst>
-          </p:cNvPr>
-          <p:cNvSpPr txBox="1"/>
-          <p:nvPr/>
-        </p:nvSpPr>
-        <p:spPr>
-          <a:xfrm>
-            <a:off x="5262372" y="2342164"/>
-            <a:ext cx="502061" cy="276999"/>
-          </a:xfrm>
-          <a:prstGeom prst="rect">
-            <a:avLst/>
-          </a:prstGeom>
-          <a:noFill/>
-        </p:spPr>
-        <p:txBody>
-          <a:bodyPr wrap="none" rtlCol="0">
-            <a:spAutoFit/>
-          </a:bodyPr>
-          <a:lstStyle/>
-          <a:p>
-            <a:r>
-              <a:rPr lang="en-US" sz="1200" dirty="0"/>
-              <a:t>3.3 V</a:t>
-            </a:r>
-          </a:p>
-        </p:txBody>
-      </p:sp>
-      <p:sp>
-        <p:nvSpPr>
-          <p:cNvPr id="100" name="TextBox 99">
-            <a:extLst>
-              <a:ext uri="{FF2B5EF4-FFF2-40B4-BE49-F238E27FC236}">
-                <a16:creationId xmlns:a16="http://schemas.microsoft.com/office/drawing/2014/main" id="{7A1D6DFB-EA48-C843-B828-B2530586DA48}"/>
-              </a:ext>
-            </a:extLst>
-          </p:cNvPr>
-          <p:cNvSpPr txBox="1"/>
-          <p:nvPr/>
-        </p:nvSpPr>
-        <p:spPr>
-          <a:xfrm>
-            <a:off x="7879938" y="2231477"/>
-            <a:ext cx="385042" cy="276999"/>
-          </a:xfrm>
-          <a:prstGeom prst="rect">
-            <a:avLst/>
-          </a:prstGeom>
-          <a:noFill/>
-        </p:spPr>
-        <p:txBody>
-          <a:bodyPr wrap="none" rtlCol="0">
-            <a:spAutoFit/>
-          </a:bodyPr>
-          <a:lstStyle/>
-          <a:p>
-            <a:r>
-              <a:rPr lang="en-US" sz="1200" dirty="0"/>
-              <a:t>5 V</a:t>
-            </a:r>
-          </a:p>
-        </p:txBody>
-      </p:sp>
-      <p:cxnSp>
-        <p:nvCxnSpPr>
-          <p:cNvPr id="104" name="Straight Connector 103">
-            <a:extLst>
-              <a:ext uri="{FF2B5EF4-FFF2-40B4-BE49-F238E27FC236}">
-                <a16:creationId xmlns:a16="http://schemas.microsoft.com/office/drawing/2014/main" id="{4E324523-CBBD-7249-B831-23FB0009F073}"/>
-              </a:ext>
-            </a:extLst>
-          </p:cNvPr>
-          <p:cNvCxnSpPr>
-            <a:cxnSpLocks/>
-          </p:cNvCxnSpPr>
-          <p:nvPr/>
-        </p:nvCxnSpPr>
-        <p:spPr>
-          <a:xfrm>
-            <a:off x="5262372" y="1802401"/>
-            <a:ext cx="0" cy="2620594"/>
-          </a:xfrm>
-          <a:prstGeom prst="line">
-            <a:avLst/>
-          </a:prstGeom>
-        </p:spPr>
-        <p:style>
-          <a:lnRef idx="1">
-            <a:schemeClr val="accent1"/>
-          </a:lnRef>
-          <a:fillRef idx="0">
-            <a:schemeClr val="accent1"/>
-          </a:fillRef>
-          <a:effectRef idx="0">
-            <a:schemeClr val="accent1"/>
-          </a:effectRef>
-          <a:fontRef idx="minor">
-            <a:schemeClr val="tx1"/>
-          </a:fontRef>
-        </p:style>
-      </p:cxnSp>
-      <p:sp>
-        <p:nvSpPr>
-          <p:cNvPr id="106" name="TextBox 105">
-            <a:extLst>
-              <a:ext uri="{FF2B5EF4-FFF2-40B4-BE49-F238E27FC236}">
-                <a16:creationId xmlns:a16="http://schemas.microsoft.com/office/drawing/2014/main" id="{AEB103E2-12A6-554C-B642-93006536FCB9}"/>
-              </a:ext>
-            </a:extLst>
-          </p:cNvPr>
-          <p:cNvSpPr txBox="1"/>
-          <p:nvPr/>
-        </p:nvSpPr>
-        <p:spPr>
-          <a:xfrm>
-            <a:off x="4928421" y="2125566"/>
-            <a:ext cx="385042" cy="276999"/>
-          </a:xfrm>
-          <a:prstGeom prst="rect">
-            <a:avLst/>
-          </a:prstGeom>
-          <a:noFill/>
-        </p:spPr>
-        <p:txBody>
-          <a:bodyPr wrap="none" rtlCol="0">
-            <a:spAutoFit/>
-          </a:bodyPr>
-          <a:lstStyle/>
-          <a:p>
-            <a:r>
-              <a:rPr lang="en-US" sz="1200" dirty="0"/>
-              <a:t>5 V</a:t>
-            </a:r>
-          </a:p>
-        </p:txBody>
-      </p:sp>
-      <p:sp>
-        <p:nvSpPr>
-          <p:cNvPr id="39" name="TextBox 38">
-            <a:extLst>
-              <a:ext uri="{FF2B5EF4-FFF2-40B4-BE49-F238E27FC236}">
-                <a16:creationId xmlns:a16="http://schemas.microsoft.com/office/drawing/2014/main" id="{3F97B85D-86A0-C944-856C-35F3DCEF7360}"/>
-              </a:ext>
-            </a:extLst>
-          </p:cNvPr>
-          <p:cNvSpPr txBox="1"/>
-          <p:nvPr/>
-        </p:nvSpPr>
-        <p:spPr>
-          <a:xfrm>
-            <a:off x="6766560" y="4561495"/>
-            <a:ext cx="1249680" cy="369332"/>
+            <a:off x="6447263" y="2058802"/>
+            <a:ext cx="1584554" cy="369332"/>
           </a:xfrm>
           <a:prstGeom prst="rect">
             <a:avLst/>
@@ -4827,268 +4808,36 @@
             <a:pPr algn="ctr"/>
             <a:r>
               <a:rPr lang="en-US" dirty="0"/>
-              <a:t>GPS</a:t>
-            </a:r>
+              <a:t>Burn Wire </a:t>
+            </a:r>
+            <a:r>
+              <a:rPr lang="en-US" dirty="0" err="1"/>
+              <a:t>Ckt</a:t>
+            </a:r>
+            <a:endParaRPr lang="en-US" dirty="0"/>
           </a:p>
         </p:txBody>
       </p:sp>
       <p:cxnSp>
         <p:nvCxnSpPr>
-          <p:cNvPr id="3" name="Straight Connector 2">
-            <a:extLst>
-              <a:ext uri="{FF2B5EF4-FFF2-40B4-BE49-F238E27FC236}">
-                <a16:creationId xmlns:a16="http://schemas.microsoft.com/office/drawing/2014/main" id="{73AA2462-7369-C741-A817-60A7F51FF3E8}"/>
+          <p:cNvPr id="91" name="Straight Connector 90">
+            <a:extLst>
+              <a:ext uri="{FF2B5EF4-FFF2-40B4-BE49-F238E27FC236}">
+                <a16:creationId xmlns:a16="http://schemas.microsoft.com/office/drawing/2014/main" id="{913CAFDB-1466-47C8-9335-5C2A29BF6EE2}"/>
               </a:ext>
             </a:extLst>
           </p:cNvPr>
           <p:cNvCxnSpPr>
             <a:cxnSpLocks/>
-            <a:stCxn id="39" idx="1"/>
-            <a:endCxn id="11" idx="3"/>
+            <a:stCxn id="85" idx="3"/>
+            <a:endCxn id="71" idx="1"/>
           </p:cNvCxnSpPr>
           <p:nvPr/>
         </p:nvCxnSpPr>
         <p:spPr>
-          <a:xfrm flipH="1">
-            <a:off x="6324600" y="4746161"/>
-            <a:ext cx="441960" cy="0"/>
-          </a:xfrm>
-          <a:prstGeom prst="line">
-            <a:avLst/>
-          </a:prstGeom>
-        </p:spPr>
-        <p:style>
-          <a:lnRef idx="1">
-            <a:schemeClr val="accent1"/>
-          </a:lnRef>
-          <a:fillRef idx="0">
-            <a:schemeClr val="accent1"/>
-          </a:fillRef>
-          <a:effectRef idx="0">
-            <a:schemeClr val="accent1"/>
-          </a:effectRef>
-          <a:fontRef idx="minor">
-            <a:schemeClr val="tx1"/>
-          </a:fontRef>
-        </p:style>
-      </p:cxnSp>
-      <p:sp>
-        <p:nvSpPr>
-          <p:cNvPr id="43" name="TextBox 42">
-            <a:extLst>
-              <a:ext uri="{FF2B5EF4-FFF2-40B4-BE49-F238E27FC236}">
-                <a16:creationId xmlns:a16="http://schemas.microsoft.com/office/drawing/2014/main" id="{3EBA54D1-85C7-0248-A2C7-0884692EC57A}"/>
-              </a:ext>
-            </a:extLst>
-          </p:cNvPr>
-          <p:cNvSpPr txBox="1"/>
-          <p:nvPr/>
-        </p:nvSpPr>
-        <p:spPr>
-          <a:xfrm>
-            <a:off x="5699760" y="3805257"/>
-            <a:ext cx="474745" cy="276999"/>
-          </a:xfrm>
-          <a:prstGeom prst="rect">
-            <a:avLst/>
-          </a:prstGeom>
-          <a:noFill/>
-        </p:spPr>
-        <p:txBody>
-          <a:bodyPr wrap="none" rtlCol="0">
-            <a:spAutoFit/>
-          </a:bodyPr>
-          <a:lstStyle/>
-          <a:p>
-            <a:r>
-              <a:rPr lang="en-US" sz="1200" dirty="0"/>
-              <a:t>Data</a:t>
-            </a:r>
-          </a:p>
-        </p:txBody>
-      </p:sp>
-      <p:sp>
-        <p:nvSpPr>
-          <p:cNvPr id="45" name="TextBox 44">
-            <a:extLst>
-              <a:ext uri="{FF2B5EF4-FFF2-40B4-BE49-F238E27FC236}">
-                <a16:creationId xmlns:a16="http://schemas.microsoft.com/office/drawing/2014/main" id="{23D2131A-4B85-D246-8A78-5E5444810833}"/>
-              </a:ext>
-            </a:extLst>
-          </p:cNvPr>
-          <p:cNvSpPr txBox="1"/>
-          <p:nvPr/>
-        </p:nvSpPr>
-        <p:spPr>
-          <a:xfrm>
-            <a:off x="2294735" y="2896404"/>
-            <a:ext cx="474745" cy="276999"/>
-          </a:xfrm>
-          <a:prstGeom prst="rect">
-            <a:avLst/>
-          </a:prstGeom>
-          <a:noFill/>
-        </p:spPr>
-        <p:txBody>
-          <a:bodyPr wrap="none" rtlCol="0">
-            <a:spAutoFit/>
-          </a:bodyPr>
-          <a:lstStyle/>
-          <a:p>
-            <a:r>
-              <a:rPr lang="en-US" sz="1200" dirty="0"/>
-              <a:t>Data</a:t>
-            </a:r>
-          </a:p>
-        </p:txBody>
-      </p:sp>
-      <p:sp>
-        <p:nvSpPr>
-          <p:cNvPr id="47" name="TextBox 46">
-            <a:extLst>
-              <a:ext uri="{FF2B5EF4-FFF2-40B4-BE49-F238E27FC236}">
-                <a16:creationId xmlns:a16="http://schemas.microsoft.com/office/drawing/2014/main" id="{E0AC6822-B185-1C46-9F48-0E56F4C2CAAE}"/>
-              </a:ext>
-            </a:extLst>
-          </p:cNvPr>
-          <p:cNvSpPr txBox="1"/>
-          <p:nvPr/>
-        </p:nvSpPr>
-        <p:spPr>
-          <a:xfrm>
-            <a:off x="7019523" y="3164827"/>
-            <a:ext cx="503664" cy="276999"/>
-          </a:xfrm>
-          <a:prstGeom prst="rect">
-            <a:avLst/>
-          </a:prstGeom>
-          <a:noFill/>
-        </p:spPr>
-        <p:txBody>
-          <a:bodyPr wrap="none" rtlCol="0">
-            <a:spAutoFit/>
-          </a:bodyPr>
-          <a:lstStyle/>
-          <a:p>
-            <a:r>
-              <a:rPr lang="en-US" sz="1200" dirty="0"/>
-              <a:t>Logic</a:t>
-            </a:r>
-          </a:p>
-        </p:txBody>
-      </p:sp>
-      <p:sp>
-        <p:nvSpPr>
-          <p:cNvPr id="18" name="Triangle 17">
-            <a:extLst>
-              <a:ext uri="{FF2B5EF4-FFF2-40B4-BE49-F238E27FC236}">
-                <a16:creationId xmlns:a16="http://schemas.microsoft.com/office/drawing/2014/main" id="{C42B2746-EA50-B649-A2A1-BCEFE3846223}"/>
-              </a:ext>
-            </a:extLst>
-          </p:cNvPr>
-          <p:cNvSpPr/>
-          <p:nvPr/>
-        </p:nvSpPr>
-        <p:spPr>
-          <a:xfrm rot="5400000">
-            <a:off x="1908048" y="4561495"/>
-            <a:ext cx="505968" cy="369332"/>
-          </a:xfrm>
-          <a:prstGeom prst="triangle">
-            <a:avLst/>
-          </a:prstGeom>
-        </p:spPr>
-        <p:style>
-          <a:lnRef idx="2">
-            <a:schemeClr val="accent1">
-              <a:shade val="50000"/>
-            </a:schemeClr>
-          </a:lnRef>
-          <a:fillRef idx="1">
-            <a:schemeClr val="accent1"/>
-          </a:fillRef>
-          <a:effectRef idx="0">
-            <a:schemeClr val="accent1"/>
-          </a:effectRef>
-          <a:fontRef idx="minor">
-            <a:schemeClr val="lt1"/>
-          </a:fontRef>
-        </p:style>
-        <p:txBody>
-          <a:bodyPr rtlCol="0" anchor="ctr"/>
-          <a:lstStyle/>
-          <a:p>
-            <a:pPr algn="ctr"/>
-            <a:endParaRPr lang="en-US"/>
-          </a:p>
-        </p:txBody>
-      </p:sp>
-      <p:sp>
-        <p:nvSpPr>
-          <p:cNvPr id="48" name="Triangle 47">
-            <a:extLst>
-              <a:ext uri="{FF2B5EF4-FFF2-40B4-BE49-F238E27FC236}">
-                <a16:creationId xmlns:a16="http://schemas.microsoft.com/office/drawing/2014/main" id="{E7CD0DA0-8559-7D48-8D8C-6CDB54884023}"/>
-              </a:ext>
-            </a:extLst>
-          </p:cNvPr>
-          <p:cNvSpPr/>
-          <p:nvPr/>
-        </p:nvSpPr>
-        <p:spPr>
-          <a:xfrm rot="16200000">
-            <a:off x="2371978" y="339832"/>
-            <a:ext cx="505968" cy="369332"/>
-          </a:xfrm>
-          <a:prstGeom prst="triangle">
-            <a:avLst/>
-          </a:prstGeom>
-        </p:spPr>
-        <p:style>
-          <a:lnRef idx="2">
-            <a:schemeClr val="accent1">
-              <a:shade val="50000"/>
-            </a:schemeClr>
-          </a:lnRef>
-          <a:fillRef idx="1">
-            <a:schemeClr val="accent1"/>
-          </a:fillRef>
-          <a:effectRef idx="0">
-            <a:schemeClr val="accent1"/>
-          </a:effectRef>
-          <a:fontRef idx="minor">
-            <a:schemeClr val="lt1"/>
-          </a:fontRef>
-        </p:style>
-        <p:txBody>
-          <a:bodyPr rtlCol="0" anchor="ctr"/>
-          <a:lstStyle/>
-          <a:p>
-            <a:pPr algn="ctr"/>
-            <a:endParaRPr lang="en-US"/>
-          </a:p>
-        </p:txBody>
-      </p:sp>
-      <p:cxnSp>
-        <p:nvCxnSpPr>
-          <p:cNvPr id="21" name="Straight Connector 20">
-            <a:extLst>
-              <a:ext uri="{FF2B5EF4-FFF2-40B4-BE49-F238E27FC236}">
-                <a16:creationId xmlns:a16="http://schemas.microsoft.com/office/drawing/2014/main" id="{FE964AFA-B4D3-EC4E-AF5E-6F577C7A4D52}"/>
-              </a:ext>
-            </a:extLst>
-          </p:cNvPr>
-          <p:cNvCxnSpPr>
-            <a:cxnSpLocks/>
-            <a:stCxn id="5" idx="3"/>
-            <a:endCxn id="48" idx="0"/>
-          </p:cNvCxnSpPr>
-          <p:nvPr/>
-        </p:nvCxnSpPr>
-        <p:spPr>
-          <a:xfrm>
-            <a:off x="1908048" y="524498"/>
-            <a:ext cx="532248" cy="0"/>
+          <a:xfrm flipV="1">
+            <a:off x="8031817" y="2237666"/>
+            <a:ext cx="650469" cy="5802"/>
           </a:xfrm>
           <a:prstGeom prst="line">
             <a:avLst/>
@@ -5111,24 +4860,389 @@
       </p:cxnSp>
       <p:cxnSp>
         <p:nvCxnSpPr>
-          <p:cNvPr id="25" name="Straight Connector 24">
-            <a:extLst>
-              <a:ext uri="{FF2B5EF4-FFF2-40B4-BE49-F238E27FC236}">
-                <a16:creationId xmlns:a16="http://schemas.microsoft.com/office/drawing/2014/main" id="{E99DD24D-D66E-B54C-831B-8A36B63DFB6D}"/>
+          <p:cNvPr id="102" name="Straight Connector 101">
+            <a:extLst>
+              <a:ext uri="{FF2B5EF4-FFF2-40B4-BE49-F238E27FC236}">
+                <a16:creationId xmlns:a16="http://schemas.microsoft.com/office/drawing/2014/main" id="{A5BC7BC8-865C-4064-AA8B-EAAA8B7C4102}"/>
               </a:ext>
             </a:extLst>
           </p:cNvPr>
           <p:cNvCxnSpPr>
-            <a:cxnSpLocks/>
-            <a:stCxn id="12" idx="1"/>
-            <a:endCxn id="18" idx="0"/>
+            <a:stCxn id="75" idx="2"/>
           </p:cNvCxnSpPr>
           <p:nvPr/>
         </p:nvCxnSpPr>
         <p:spPr>
+          <a:xfrm>
+            <a:off x="3804012" y="2899729"/>
+            <a:ext cx="0" cy="273674"/>
+          </a:xfrm>
+          <a:prstGeom prst="line">
+            <a:avLst/>
+          </a:prstGeom>
+        </p:spPr>
+        <p:style>
+          <a:lnRef idx="1">
+            <a:schemeClr val="accent1"/>
+          </a:lnRef>
+          <a:fillRef idx="0">
+            <a:schemeClr val="accent1"/>
+          </a:fillRef>
+          <a:effectRef idx="0">
+            <a:schemeClr val="accent1"/>
+          </a:effectRef>
+          <a:fontRef idx="minor">
+            <a:schemeClr val="tx1"/>
+          </a:fontRef>
+        </p:style>
+      </p:cxnSp>
+      <p:cxnSp>
+        <p:nvCxnSpPr>
+          <p:cNvPr id="105" name="Straight Connector 104">
+            <a:extLst>
+              <a:ext uri="{FF2B5EF4-FFF2-40B4-BE49-F238E27FC236}">
+                <a16:creationId xmlns:a16="http://schemas.microsoft.com/office/drawing/2014/main" id="{F6875B5D-85B4-4CF3-A178-516E2F4116FE}"/>
+              </a:ext>
+            </a:extLst>
+          </p:cNvPr>
+          <p:cNvCxnSpPr/>
+          <p:nvPr/>
+        </p:nvCxnSpPr>
+        <p:spPr>
+          <a:xfrm>
+            <a:off x="3173502" y="2458299"/>
+            <a:ext cx="0" cy="698194"/>
+          </a:xfrm>
+          <a:prstGeom prst="line">
+            <a:avLst/>
+          </a:prstGeom>
+        </p:spPr>
+        <p:style>
+          <a:lnRef idx="1">
+            <a:schemeClr val="accent1"/>
+          </a:lnRef>
+          <a:fillRef idx="0">
+            <a:schemeClr val="accent1"/>
+          </a:fillRef>
+          <a:effectRef idx="0">
+            <a:schemeClr val="accent1"/>
+          </a:effectRef>
+          <a:fontRef idx="minor">
+            <a:schemeClr val="tx1"/>
+          </a:fontRef>
+        </p:style>
+      </p:cxnSp>
+      <p:sp>
+        <p:nvSpPr>
+          <p:cNvPr id="75" name="TextBox 74">
+            <a:extLst>
+              <a:ext uri="{FF2B5EF4-FFF2-40B4-BE49-F238E27FC236}">
+                <a16:creationId xmlns:a16="http://schemas.microsoft.com/office/drawing/2014/main" id="{9B2E811F-7875-49EE-8032-6368F50C5F22}"/>
+              </a:ext>
+            </a:extLst>
+          </p:cNvPr>
+          <p:cNvSpPr txBox="1"/>
+          <p:nvPr/>
+        </p:nvSpPr>
+        <p:spPr>
+          <a:xfrm>
+            <a:off x="3017736" y="2530397"/>
+            <a:ext cx="1572552" cy="369332"/>
+          </a:xfrm>
+          <a:prstGeom prst="rect">
+            <a:avLst/>
+          </a:prstGeom>
+          <a:solidFill>
+            <a:schemeClr val="bg1"/>
+          </a:solidFill>
+          <a:ln>
+            <a:solidFill>
+              <a:schemeClr val="tx1"/>
+            </a:solidFill>
+          </a:ln>
+        </p:spPr>
+        <p:txBody>
+          <a:bodyPr wrap="square" rtlCol="0">
+            <a:spAutoFit/>
+          </a:bodyPr>
+          <a:lstStyle/>
+          <a:p>
+            <a:pPr algn="ctr"/>
+            <a:r>
+              <a:rPr lang="en-US" dirty="0"/>
+              <a:t>Flash Memory</a:t>
+            </a:r>
+          </a:p>
+        </p:txBody>
+      </p:sp>
+      <p:cxnSp>
+        <p:nvCxnSpPr>
+          <p:cNvPr id="108" name="Straight Connector 107">
+            <a:extLst>
+              <a:ext uri="{FF2B5EF4-FFF2-40B4-BE49-F238E27FC236}">
+                <a16:creationId xmlns:a16="http://schemas.microsoft.com/office/drawing/2014/main" id="{A5922E2E-4648-4ED6-A4E8-799168CFBA87}"/>
+              </a:ext>
+            </a:extLst>
+          </p:cNvPr>
+          <p:cNvCxnSpPr>
+            <a:stCxn id="85" idx="1"/>
+          </p:cNvCxnSpPr>
+          <p:nvPr/>
+        </p:nvCxnSpPr>
+        <p:spPr>
           <a:xfrm flipH="1">
-            <a:off x="2345698" y="4746161"/>
-            <a:ext cx="778502" cy="0"/>
+            <a:off x="5699760" y="2243468"/>
+            <a:ext cx="747503" cy="4296"/>
+          </a:xfrm>
+          <a:prstGeom prst="line">
+            <a:avLst/>
+          </a:prstGeom>
+        </p:spPr>
+        <p:style>
+          <a:lnRef idx="1">
+            <a:schemeClr val="accent1"/>
+          </a:lnRef>
+          <a:fillRef idx="0">
+            <a:schemeClr val="accent1"/>
+          </a:fillRef>
+          <a:effectRef idx="0">
+            <a:schemeClr val="accent1"/>
+          </a:effectRef>
+          <a:fontRef idx="minor">
+            <a:schemeClr val="tx1"/>
+          </a:fontRef>
+        </p:style>
+      </p:cxnSp>
+      <p:cxnSp>
+        <p:nvCxnSpPr>
+          <p:cNvPr id="129" name="Straight Connector 128">
+            <a:extLst>
+              <a:ext uri="{FF2B5EF4-FFF2-40B4-BE49-F238E27FC236}">
+                <a16:creationId xmlns:a16="http://schemas.microsoft.com/office/drawing/2014/main" id="{8850F4B7-D13B-4075-A16C-E5FBBE2A04AE}"/>
+              </a:ext>
+            </a:extLst>
+          </p:cNvPr>
+          <p:cNvCxnSpPr>
+            <a:stCxn id="6" idx="3"/>
+            <a:endCxn id="15" idx="1"/>
+          </p:cNvCxnSpPr>
+          <p:nvPr/>
+        </p:nvCxnSpPr>
+        <p:spPr>
+          <a:xfrm>
+            <a:off x="6254496" y="3173161"/>
+            <a:ext cx="337720" cy="242"/>
+          </a:xfrm>
+          <a:prstGeom prst="line">
+            <a:avLst/>
+          </a:prstGeom>
+        </p:spPr>
+        <p:style>
+          <a:lnRef idx="1">
+            <a:schemeClr val="accent1"/>
+          </a:lnRef>
+          <a:fillRef idx="0">
+            <a:schemeClr val="accent1"/>
+          </a:fillRef>
+          <a:effectRef idx="0">
+            <a:schemeClr val="accent1"/>
+          </a:effectRef>
+          <a:fontRef idx="minor">
+            <a:schemeClr val="tx1"/>
+          </a:fontRef>
+        </p:style>
+      </p:cxnSp>
+      <p:sp>
+        <p:nvSpPr>
+          <p:cNvPr id="133" name="TextBox 132">
+            <a:extLst>
+              <a:ext uri="{FF2B5EF4-FFF2-40B4-BE49-F238E27FC236}">
+                <a16:creationId xmlns:a16="http://schemas.microsoft.com/office/drawing/2014/main" id="{A6310D95-3454-4636-8E2C-83A9CF9E1EF2}"/>
+              </a:ext>
+            </a:extLst>
+          </p:cNvPr>
+          <p:cNvSpPr txBox="1"/>
+          <p:nvPr/>
+        </p:nvSpPr>
+        <p:spPr>
+          <a:xfrm>
+            <a:off x="522057" y="3242803"/>
+            <a:ext cx="1454309" cy="369332"/>
+          </a:xfrm>
+          <a:prstGeom prst="rect">
+            <a:avLst/>
+          </a:prstGeom>
+          <a:noFill/>
+        </p:spPr>
+        <p:txBody>
+          <a:bodyPr wrap="none" rtlCol="0">
+            <a:spAutoFit/>
+          </a:bodyPr>
+          <a:lstStyle/>
+          <a:p>
+            <a:r>
+              <a:rPr lang="en-US" dirty="0" err="1">
+                <a:solidFill>
+                  <a:schemeClr val="tx1">
+                    <a:lumMod val="95000"/>
+                    <a:lumOff val="5000"/>
+                  </a:schemeClr>
+                </a:solidFill>
+              </a:rPr>
+              <a:t>MotherBoard</a:t>
+            </a:r>
+            <a:endParaRPr lang="en-US" dirty="0">
+              <a:solidFill>
+                <a:schemeClr val="tx1">
+                  <a:lumMod val="95000"/>
+                  <a:lumOff val="5000"/>
+                </a:schemeClr>
+              </a:solidFill>
+            </a:endParaRPr>
+          </a:p>
+        </p:txBody>
+      </p:sp>
+      <p:sp>
+        <p:nvSpPr>
+          <p:cNvPr id="134" name="TextBox 133">
+            <a:extLst>
+              <a:ext uri="{FF2B5EF4-FFF2-40B4-BE49-F238E27FC236}">
+                <a16:creationId xmlns:a16="http://schemas.microsoft.com/office/drawing/2014/main" id="{2BE8D5C7-C7DA-46B5-8997-4E82700E4D1E}"/>
+              </a:ext>
+            </a:extLst>
+          </p:cNvPr>
+          <p:cNvSpPr txBox="1"/>
+          <p:nvPr/>
+        </p:nvSpPr>
+        <p:spPr>
+          <a:xfrm>
+            <a:off x="2821941" y="5240265"/>
+            <a:ext cx="916020" cy="369332"/>
+          </a:xfrm>
+          <a:prstGeom prst="rect">
+            <a:avLst/>
+          </a:prstGeom>
+          <a:noFill/>
+        </p:spPr>
+        <p:txBody>
+          <a:bodyPr wrap="none" rtlCol="0">
+            <a:spAutoFit/>
+          </a:bodyPr>
+          <a:lstStyle/>
+          <a:p>
+            <a:r>
+              <a:rPr lang="en-US" dirty="0">
+                <a:solidFill>
+                  <a:schemeClr val="tx1">
+                    <a:lumMod val="95000"/>
+                    <a:lumOff val="5000"/>
+                  </a:schemeClr>
+                </a:solidFill>
+              </a:rPr>
+              <a:t>Payload</a:t>
+            </a:r>
+          </a:p>
+        </p:txBody>
+      </p:sp>
+      <p:sp>
+        <p:nvSpPr>
+          <p:cNvPr id="135" name="TextBox 134">
+            <a:extLst>
+              <a:ext uri="{FF2B5EF4-FFF2-40B4-BE49-F238E27FC236}">
+                <a16:creationId xmlns:a16="http://schemas.microsoft.com/office/drawing/2014/main" id="{46EAF1C3-C50D-4A0B-A560-4648AD88282E}"/>
+              </a:ext>
+            </a:extLst>
+          </p:cNvPr>
+          <p:cNvSpPr txBox="1"/>
+          <p:nvPr/>
+        </p:nvSpPr>
+        <p:spPr>
+          <a:xfrm>
+            <a:off x="8482837" y="3275495"/>
+            <a:ext cx="1313052" cy="369332"/>
+          </a:xfrm>
+          <a:prstGeom prst="rect">
+            <a:avLst/>
+          </a:prstGeom>
+          <a:noFill/>
+        </p:spPr>
+        <p:txBody>
+          <a:bodyPr wrap="none" rtlCol="0">
+            <a:spAutoFit/>
+          </a:bodyPr>
+          <a:lstStyle/>
+          <a:p>
+            <a:r>
+              <a:rPr lang="en-US" dirty="0">
+                <a:solidFill>
+                  <a:schemeClr val="tx1">
+                    <a:lumMod val="95000"/>
+                    <a:lumOff val="5000"/>
+                  </a:schemeClr>
+                </a:solidFill>
+              </a:rPr>
+              <a:t>Solar Panels</a:t>
+            </a:r>
+          </a:p>
+        </p:txBody>
+      </p:sp>
+      <p:cxnSp>
+        <p:nvCxnSpPr>
+          <p:cNvPr id="146" name="Straight Connector 145">
+            <a:extLst>
+              <a:ext uri="{FF2B5EF4-FFF2-40B4-BE49-F238E27FC236}">
+                <a16:creationId xmlns:a16="http://schemas.microsoft.com/office/drawing/2014/main" id="{2AA93038-BA2C-434A-869C-E47B761C8C3F}"/>
+              </a:ext>
+            </a:extLst>
+          </p:cNvPr>
+          <p:cNvCxnSpPr>
+            <a:cxnSpLocks/>
+            <a:stCxn id="51" idx="1"/>
+          </p:cNvCxnSpPr>
+          <p:nvPr/>
+        </p:nvCxnSpPr>
+        <p:spPr>
+          <a:xfrm flipH="1" flipV="1">
+            <a:off x="7272509" y="2885719"/>
+            <a:ext cx="1394476" cy="21433"/>
+          </a:xfrm>
+          <a:prstGeom prst="line">
+            <a:avLst/>
+          </a:prstGeom>
+        </p:spPr>
+        <p:style>
+          <a:lnRef idx="1">
+            <a:schemeClr val="accent1"/>
+          </a:lnRef>
+          <a:fillRef idx="0">
+            <a:schemeClr val="accent1"/>
+          </a:fillRef>
+          <a:effectRef idx="0">
+            <a:schemeClr val="accent1"/>
+          </a:effectRef>
+          <a:fontRef idx="minor">
+            <a:schemeClr val="tx1"/>
+          </a:fontRef>
+        </p:style>
+      </p:cxnSp>
+      <p:cxnSp>
+        <p:nvCxnSpPr>
+          <p:cNvPr id="151" name="Straight Connector 150">
+            <a:extLst>
+              <a:ext uri="{FF2B5EF4-FFF2-40B4-BE49-F238E27FC236}">
+                <a16:creationId xmlns:a16="http://schemas.microsoft.com/office/drawing/2014/main" id="{8A7AE1A5-19A6-47E5-8C81-58E491279154}"/>
+              </a:ext>
+            </a:extLst>
+          </p:cNvPr>
+          <p:cNvCxnSpPr>
+            <a:stCxn id="15" idx="0"/>
+          </p:cNvCxnSpPr>
+          <p:nvPr/>
+        </p:nvCxnSpPr>
+        <p:spPr>
+          <a:xfrm flipH="1" flipV="1">
+            <a:off x="7272508" y="2889612"/>
+            <a:ext cx="1" cy="99125"/>
           </a:xfrm>
           <a:prstGeom prst="line">
             <a:avLst/>

</xml_diff>